<commit_message>
chore(requirements): confuse about requirements
</commit_message>
<xml_diff>
--- a/presentations/models.pptx
+++ b/presentations/models.pptx
@@ -13,6 +13,11 @@
     <p:sldId id="261" r:id="rId7"/>
     <p:sldId id="262" r:id="rId8"/>
     <p:sldId id="263" r:id="rId9"/>
+    <p:sldId id="264" r:id="rId10"/>
+    <p:sldId id="265" r:id="rId11"/>
+    <p:sldId id="266" r:id="rId12"/>
+    <p:sldId id="267" r:id="rId13"/>
+    <p:sldId id="268" r:id="rId14"/>
   </p:sldIdLst>
   <p:sldSz cx="12192000" cy="6858000"/>
   <p:notesSz cx="6858000" cy="9144000"/>
@@ -14202,7 +14207,7 @@
           <a:p>
             <a:fld id="{3248773E-0E1D-C44D-81DB-7C2B8F8EC2A7}" type="datetimeFigureOut">
               <a:rPr lang="de-DE" smtClean="0"/>
-              <a:t>02.01.20</a:t>
+              <a:t>03.01.20</a:t>
             </a:fld>
             <a:endParaRPr lang="de-DE"/>
           </a:p>
@@ -14400,7 +14405,7 @@
           <a:p>
             <a:fld id="{3248773E-0E1D-C44D-81DB-7C2B8F8EC2A7}" type="datetimeFigureOut">
               <a:rPr lang="de-DE" smtClean="0"/>
-              <a:t>02.01.20</a:t>
+              <a:t>03.01.20</a:t>
             </a:fld>
             <a:endParaRPr lang="de-DE"/>
           </a:p>
@@ -14608,7 +14613,7 @@
           <a:p>
             <a:fld id="{3248773E-0E1D-C44D-81DB-7C2B8F8EC2A7}" type="datetimeFigureOut">
               <a:rPr lang="de-DE" smtClean="0"/>
-              <a:t>02.01.20</a:t>
+              <a:t>03.01.20</a:t>
             </a:fld>
             <a:endParaRPr lang="de-DE"/>
           </a:p>
@@ -14806,7 +14811,7 @@
           <a:p>
             <a:fld id="{3248773E-0E1D-C44D-81DB-7C2B8F8EC2A7}" type="datetimeFigureOut">
               <a:rPr lang="de-DE" smtClean="0"/>
-              <a:t>02.01.20</a:t>
+              <a:t>03.01.20</a:t>
             </a:fld>
             <a:endParaRPr lang="de-DE"/>
           </a:p>
@@ -15081,7 +15086,7 @@
           <a:p>
             <a:fld id="{3248773E-0E1D-C44D-81DB-7C2B8F8EC2A7}" type="datetimeFigureOut">
               <a:rPr lang="de-DE" smtClean="0"/>
-              <a:t>02.01.20</a:t>
+              <a:t>03.01.20</a:t>
             </a:fld>
             <a:endParaRPr lang="de-DE"/>
           </a:p>
@@ -15346,7 +15351,7 @@
           <a:p>
             <a:fld id="{3248773E-0E1D-C44D-81DB-7C2B8F8EC2A7}" type="datetimeFigureOut">
               <a:rPr lang="de-DE" smtClean="0"/>
-              <a:t>02.01.20</a:t>
+              <a:t>03.01.20</a:t>
             </a:fld>
             <a:endParaRPr lang="de-DE"/>
           </a:p>
@@ -15758,7 +15763,7 @@
           <a:p>
             <a:fld id="{3248773E-0E1D-C44D-81DB-7C2B8F8EC2A7}" type="datetimeFigureOut">
               <a:rPr lang="de-DE" smtClean="0"/>
-              <a:t>02.01.20</a:t>
+              <a:t>03.01.20</a:t>
             </a:fld>
             <a:endParaRPr lang="de-DE"/>
           </a:p>
@@ -15899,7 +15904,7 @@
           <a:p>
             <a:fld id="{3248773E-0E1D-C44D-81DB-7C2B8F8EC2A7}" type="datetimeFigureOut">
               <a:rPr lang="de-DE" smtClean="0"/>
-              <a:t>02.01.20</a:t>
+              <a:t>03.01.20</a:t>
             </a:fld>
             <a:endParaRPr lang="de-DE"/>
           </a:p>
@@ -16012,7 +16017,7 @@
           <a:p>
             <a:fld id="{3248773E-0E1D-C44D-81DB-7C2B8F8EC2A7}" type="datetimeFigureOut">
               <a:rPr lang="de-DE" smtClean="0"/>
-              <a:t>02.01.20</a:t>
+              <a:t>03.01.20</a:t>
             </a:fld>
             <a:endParaRPr lang="de-DE"/>
           </a:p>
@@ -16323,7 +16328,7 @@
           <a:p>
             <a:fld id="{3248773E-0E1D-C44D-81DB-7C2B8F8EC2A7}" type="datetimeFigureOut">
               <a:rPr lang="de-DE" smtClean="0"/>
-              <a:t>02.01.20</a:t>
+              <a:t>03.01.20</a:t>
             </a:fld>
             <a:endParaRPr lang="de-DE"/>
           </a:p>
@@ -16611,7 +16616,7 @@
           <a:p>
             <a:fld id="{3248773E-0E1D-C44D-81DB-7C2B8F8EC2A7}" type="datetimeFigureOut">
               <a:rPr lang="de-DE" smtClean="0"/>
-              <a:t>02.01.20</a:t>
+              <a:t>03.01.20</a:t>
             </a:fld>
             <a:endParaRPr lang="de-DE"/>
           </a:p>
@@ -16852,7 +16857,7 @@
           <a:p>
             <a:fld id="{3248773E-0E1D-C44D-81DB-7C2B8F8EC2A7}" type="datetimeFigureOut">
               <a:rPr lang="de-DE" smtClean="0"/>
-              <a:t>02.01.20</a:t>
+              <a:t>03.01.20</a:t>
             </a:fld>
             <a:endParaRPr lang="de-DE"/>
           </a:p>
@@ -17351,6 +17356,3271 @@
     <p:extLst>
       <p:ext uri="{BB962C8B-B14F-4D97-AF65-F5344CB8AC3E}">
         <p14:creationId xmlns:p14="http://schemas.microsoft.com/office/powerpoint/2010/main" val="1964761949"/>
+      </p:ext>
+    </p:extLst>
+  </p:cSld>
+  <p:clrMapOvr>
+    <a:masterClrMapping/>
+  </p:clrMapOvr>
+</p:sld>
+</file>
+
+<file path=ppt/slides/slide10.xml><?xml version="1.0" encoding="utf-8"?>
+<p:sld xmlns:a="http://schemas.openxmlformats.org/drawingml/2006/main" xmlns:r="http://schemas.openxmlformats.org/officeDocument/2006/relationships" xmlns:p="http://schemas.openxmlformats.org/presentationml/2006/main">
+  <p:cSld>
+    <p:spTree>
+      <p:nvGrpSpPr>
+        <p:cNvPr id="1" name=""/>
+        <p:cNvGrpSpPr/>
+        <p:nvPr/>
+      </p:nvGrpSpPr>
+      <p:grpSpPr>
+        <a:xfrm>
+          <a:off x="0" y="0"/>
+          <a:ext cx="0" cy="0"/>
+          <a:chOff x="0" y="0"/>
+          <a:chExt cx="0" cy="0"/>
+        </a:xfrm>
+      </p:grpSpPr>
+      <p:sp>
+        <p:nvSpPr>
+          <p:cNvPr id="2" name="Titel 1">
+            <a:extLst>
+              <a:ext uri="{FF2B5EF4-FFF2-40B4-BE49-F238E27FC236}">
+                <a16:creationId xmlns:a16="http://schemas.microsoft.com/office/drawing/2014/main" id="{D9D65443-1235-F444-9CB9-16E111500493}"/>
+              </a:ext>
+            </a:extLst>
+          </p:cNvPr>
+          <p:cNvSpPr>
+            <a:spLocks noGrp="1"/>
+          </p:cNvSpPr>
+          <p:nvPr>
+            <p:ph type="title"/>
+          </p:nvPr>
+        </p:nvSpPr>
+        <p:spPr>
+          <a:xfrm>
+            <a:off x="838200" y="365125"/>
+            <a:ext cx="10515600" cy="233965"/>
+          </a:xfrm>
+        </p:spPr>
+        <p:txBody>
+          <a:bodyPr>
+            <a:normAutofit fontScale="90000"/>
+          </a:bodyPr>
+          <a:lstStyle/>
+          <a:p>
+            <a:r>
+              <a:rPr lang="de-DE" sz="1800" dirty="0"/>
+              <a:t>Architektur Internet </a:t>
+            </a:r>
+            <a:r>
+              <a:rPr lang="de-DE" sz="1800" dirty="0" err="1"/>
+              <a:t>of</a:t>
+            </a:r>
+            <a:r>
+              <a:rPr lang="de-DE" sz="1800" dirty="0"/>
+              <a:t> Things Service</a:t>
+            </a:r>
+          </a:p>
+        </p:txBody>
+      </p:sp>
+      <p:pic>
+        <p:nvPicPr>
+          <p:cNvPr id="4" name="Inhaltsplatzhalter 3">
+            <a:extLst>
+              <a:ext uri="{FF2B5EF4-FFF2-40B4-BE49-F238E27FC236}">
+                <a16:creationId xmlns:a16="http://schemas.microsoft.com/office/drawing/2014/main" id="{87074CC0-8C25-2F41-9697-330D3323BC6C}"/>
+              </a:ext>
+            </a:extLst>
+          </p:cNvPr>
+          <p:cNvPicPr>
+            <a:picLocks noGrp="1" noChangeAspect="1"/>
+          </p:cNvPicPr>
+          <p:nvPr>
+            <p:ph idx="1"/>
+          </p:nvPr>
+        </p:nvPicPr>
+        <p:blipFill>
+          <a:blip r:embed="rId2"/>
+          <a:stretch>
+            <a:fillRect/>
+          </a:stretch>
+        </p:blipFill>
+        <p:spPr>
+          <a:xfrm>
+            <a:off x="838200" y="590829"/>
+            <a:ext cx="8611956" cy="5586134"/>
+          </a:xfrm>
+          <a:prstGeom prst="rect">
+            <a:avLst/>
+          </a:prstGeom>
+        </p:spPr>
+      </p:pic>
+    </p:spTree>
+    <p:extLst>
+      <p:ext uri="{BB962C8B-B14F-4D97-AF65-F5344CB8AC3E}">
+        <p14:creationId xmlns:p14="http://schemas.microsoft.com/office/powerpoint/2010/main" val="1455517677"/>
+      </p:ext>
+    </p:extLst>
+  </p:cSld>
+  <p:clrMapOvr>
+    <a:masterClrMapping/>
+  </p:clrMapOvr>
+</p:sld>
+</file>
+
+<file path=ppt/slides/slide11.xml><?xml version="1.0" encoding="utf-8"?>
+<p:sld xmlns:a="http://schemas.openxmlformats.org/drawingml/2006/main" xmlns:r="http://schemas.openxmlformats.org/officeDocument/2006/relationships" xmlns:p="http://schemas.openxmlformats.org/presentationml/2006/main">
+  <p:cSld>
+    <p:spTree>
+      <p:nvGrpSpPr>
+        <p:cNvPr id="1" name=""/>
+        <p:cNvGrpSpPr/>
+        <p:nvPr/>
+      </p:nvGrpSpPr>
+      <p:grpSpPr>
+        <a:xfrm>
+          <a:off x="0" y="0"/>
+          <a:ext cx="0" cy="0"/>
+          <a:chOff x="0" y="0"/>
+          <a:chExt cx="0" cy="0"/>
+        </a:xfrm>
+      </p:grpSpPr>
+      <p:pic>
+        <p:nvPicPr>
+          <p:cNvPr id="4" name="Inhaltsplatzhalter 7">
+            <a:extLst>
+              <a:ext uri="{FF2B5EF4-FFF2-40B4-BE49-F238E27FC236}">
+                <a16:creationId xmlns:a16="http://schemas.microsoft.com/office/drawing/2014/main" id="{BD22416D-51DF-9C42-BFB0-9CD6AED63B30}"/>
+              </a:ext>
+            </a:extLst>
+          </p:cNvPr>
+          <p:cNvPicPr>
+            <a:picLocks noChangeAspect="1"/>
+          </p:cNvPicPr>
+          <p:nvPr/>
+        </p:nvPicPr>
+        <p:blipFill>
+          <a:blip r:embed="rId2"/>
+          <a:stretch>
+            <a:fillRect/>
+          </a:stretch>
+        </p:blipFill>
+        <p:spPr>
+          <a:xfrm>
+            <a:off x="1143409" y="487954"/>
+            <a:ext cx="10210391" cy="5350203"/>
+          </a:xfrm>
+          <a:prstGeom prst="rect">
+            <a:avLst/>
+          </a:prstGeom>
+        </p:spPr>
+      </p:pic>
+    </p:spTree>
+    <p:extLst>
+      <p:ext uri="{BB962C8B-B14F-4D97-AF65-F5344CB8AC3E}">
+        <p14:creationId xmlns:p14="http://schemas.microsoft.com/office/powerpoint/2010/main" val="631964177"/>
+      </p:ext>
+    </p:extLst>
+  </p:cSld>
+  <p:clrMapOvr>
+    <a:masterClrMapping/>
+  </p:clrMapOvr>
+</p:sld>
+</file>
+
+<file path=ppt/slides/slide12.xml><?xml version="1.0" encoding="utf-8"?>
+<p:sld xmlns:a="http://schemas.openxmlformats.org/drawingml/2006/main" xmlns:r="http://schemas.openxmlformats.org/officeDocument/2006/relationships" xmlns:p="http://schemas.openxmlformats.org/presentationml/2006/main">
+  <p:cSld>
+    <p:spTree>
+      <p:nvGrpSpPr>
+        <p:cNvPr id="1" name=""/>
+        <p:cNvGrpSpPr/>
+        <p:nvPr/>
+      </p:nvGrpSpPr>
+      <p:grpSpPr>
+        <a:xfrm>
+          <a:off x="0" y="0"/>
+          <a:ext cx="0" cy="0"/>
+          <a:chOff x="0" y="0"/>
+          <a:chExt cx="0" cy="0"/>
+        </a:xfrm>
+      </p:grpSpPr>
+      <p:sp>
+        <p:nvSpPr>
+          <p:cNvPr id="4" name="Titel 1">
+            <a:extLst>
+              <a:ext uri="{FF2B5EF4-FFF2-40B4-BE49-F238E27FC236}">
+                <a16:creationId xmlns:a16="http://schemas.microsoft.com/office/drawing/2014/main" id="{668BA56F-3BCA-F741-91C2-C169897FDE69}"/>
+              </a:ext>
+            </a:extLst>
+          </p:cNvPr>
+          <p:cNvSpPr txBox="1">
+            <a:spLocks/>
+          </p:cNvSpPr>
+          <p:nvPr/>
+        </p:nvSpPr>
+        <p:spPr>
+          <a:xfrm>
+            <a:off x="192088" y="1"/>
+            <a:ext cx="11807824" cy="332656"/>
+          </a:xfrm>
+          <a:prstGeom prst="rect">
+            <a:avLst/>
+          </a:prstGeom>
+        </p:spPr>
+        <p:txBody>
+          <a:bodyPr vert="horz" lIns="91440" tIns="45720" rIns="91440" bIns="45720" rtlCol="0" anchor="ctr">
+            <a:normAutofit fontScale="47500" lnSpcReduction="20000"/>
+          </a:bodyPr>
+          <a:lstStyle>
+            <a:lvl1pPr algn="l" defTabSz="914400" rtl="0" eaLnBrk="1" latinLnBrk="0" hangingPunct="1">
+              <a:lnSpc>
+                <a:spcPct val="90000"/>
+              </a:lnSpc>
+              <a:spcBef>
+                <a:spcPct val="0"/>
+              </a:spcBef>
+              <a:buNone/>
+              <a:defRPr sz="4400" kern="1200">
+                <a:solidFill>
+                  <a:schemeClr val="tx1"/>
+                </a:solidFill>
+                <a:latin typeface="+mj-lt"/>
+                <a:ea typeface="+mj-ea"/>
+                <a:cs typeface="+mj-cs"/>
+              </a:defRPr>
+            </a:lvl1pPr>
+          </a:lstStyle>
+          <a:p>
+            <a:r>
+              <a:rPr lang="de-DE"/>
+              <a:t>SAP Leonardo IoT Foundation und Edge</a:t>
+            </a:r>
+            <a:endParaRPr lang="de-DE" dirty="0"/>
+          </a:p>
+        </p:txBody>
+      </p:sp>
+      <p:sp>
+        <p:nvSpPr>
+          <p:cNvPr id="5" name="Datumsplatzhalter 3">
+            <a:extLst>
+              <a:ext uri="{FF2B5EF4-FFF2-40B4-BE49-F238E27FC236}">
+                <a16:creationId xmlns:a16="http://schemas.microsoft.com/office/drawing/2014/main" id="{8A6A60AE-C548-DF41-9FDF-815F597298DB}"/>
+              </a:ext>
+            </a:extLst>
+          </p:cNvPr>
+          <p:cNvSpPr>
+            <a:spLocks noGrp="1"/>
+          </p:cNvSpPr>
+          <p:nvPr>
+            <p:ph type="dt" sz="half" idx="10"/>
+          </p:nvPr>
+        </p:nvSpPr>
+        <p:spPr>
+          <a:xfrm>
+            <a:off x="192088" y="6597650"/>
+            <a:ext cx="1079376" cy="215901"/>
+          </a:xfrm>
+        </p:spPr>
+        <p:txBody>
+          <a:bodyPr/>
+          <a:lstStyle/>
+          <a:p>
+            <a:fld id="{D15945BB-CB13-F048-8038-6D73515B4389}" type="datetime1">
+              <a:rPr lang="de-DE" smtClean="0"/>
+              <a:pPr/>
+              <a:t>03.01.20</a:t>
+            </a:fld>
+            <a:endParaRPr lang="de-DE" dirty="0"/>
+          </a:p>
+        </p:txBody>
+      </p:sp>
+      <p:sp>
+        <p:nvSpPr>
+          <p:cNvPr id="6" name="Fußzeilenplatzhalter 4">
+            <a:extLst>
+              <a:ext uri="{FF2B5EF4-FFF2-40B4-BE49-F238E27FC236}">
+                <a16:creationId xmlns:a16="http://schemas.microsoft.com/office/drawing/2014/main" id="{7CA73DC4-AC17-0A41-9D0A-C84F0D908491}"/>
+              </a:ext>
+            </a:extLst>
+          </p:cNvPr>
+          <p:cNvSpPr>
+            <a:spLocks noGrp="1"/>
+          </p:cNvSpPr>
+          <p:nvPr>
+            <p:ph type="ftr" sz="quarter" idx="11"/>
+          </p:nvPr>
+        </p:nvSpPr>
+        <p:spPr>
+          <a:xfrm>
+            <a:off x="1631504" y="6597650"/>
+            <a:ext cx="8928992" cy="215899"/>
+          </a:xfrm>
+        </p:spPr>
+        <p:txBody>
+          <a:bodyPr/>
+          <a:lstStyle/>
+          <a:p>
+            <a:endParaRPr lang="de-DE"/>
+          </a:p>
+        </p:txBody>
+      </p:sp>
+      <p:sp>
+        <p:nvSpPr>
+          <p:cNvPr id="7" name="Foliennummernplatzhalter 5">
+            <a:extLst>
+              <a:ext uri="{FF2B5EF4-FFF2-40B4-BE49-F238E27FC236}">
+                <a16:creationId xmlns:a16="http://schemas.microsoft.com/office/drawing/2014/main" id="{F99F4C49-23DC-3E46-ABB2-E47FF43E0BE5}"/>
+              </a:ext>
+            </a:extLst>
+          </p:cNvPr>
+          <p:cNvSpPr>
+            <a:spLocks noGrp="1"/>
+          </p:cNvSpPr>
+          <p:nvPr>
+            <p:ph type="sldNum" sz="quarter" idx="12"/>
+          </p:nvPr>
+        </p:nvSpPr>
+        <p:spPr>
+          <a:xfrm>
+            <a:off x="10920537" y="6597649"/>
+            <a:ext cx="1079376" cy="215900"/>
+          </a:xfrm>
+        </p:spPr>
+        <p:txBody>
+          <a:bodyPr/>
+          <a:lstStyle/>
+          <a:p>
+            <a:fld id="{1DA9AA31-D53F-D84D-B952-53212CE9E554}" type="slidenum">
+              <a:rPr lang="de-DE" smtClean="0"/>
+              <a:pPr/>
+              <a:t>12</a:t>
+            </a:fld>
+            <a:endParaRPr lang="de-DE"/>
+          </a:p>
+        </p:txBody>
+      </p:sp>
+      <p:sp>
+        <p:nvSpPr>
+          <p:cNvPr id="8" name="Shape 2158">
+            <a:extLst>
+              <a:ext uri="{FF2B5EF4-FFF2-40B4-BE49-F238E27FC236}">
+                <a16:creationId xmlns:a16="http://schemas.microsoft.com/office/drawing/2014/main" id="{E54C41D4-99EB-684C-B856-DC07CAEF4979}"/>
+              </a:ext>
+            </a:extLst>
+          </p:cNvPr>
+          <p:cNvSpPr/>
+          <p:nvPr/>
+        </p:nvSpPr>
+        <p:spPr>
+          <a:xfrm>
+            <a:off x="9917439" y="2286076"/>
+            <a:ext cx="1327144" cy="2441169"/>
+          </a:xfrm>
+          <a:prstGeom prst="roundRect">
+            <a:avLst>
+              <a:gd name="adj" fmla="val 399"/>
+            </a:avLst>
+          </a:prstGeom>
+          <a:noFill/>
+          <a:ln w="19050" cap="rnd">
+            <a:solidFill>
+              <a:schemeClr val="tx1">
+                <a:lumMod val="65000"/>
+                <a:lumOff val="35000"/>
+              </a:schemeClr>
+            </a:solidFill>
+            <a:prstDash val="sysDot"/>
+          </a:ln>
+        </p:spPr>
+        <p:style>
+          <a:lnRef idx="2">
+            <a:schemeClr val="accent1">
+              <a:shade val="50000"/>
+            </a:schemeClr>
+          </a:lnRef>
+          <a:fillRef idx="1">
+            <a:schemeClr val="accent1"/>
+          </a:fillRef>
+          <a:effectRef idx="0">
+            <a:schemeClr val="accent1"/>
+          </a:effectRef>
+          <a:fontRef idx="minor">
+            <a:schemeClr val="lt1"/>
+          </a:fontRef>
+        </p:style>
+        <p:txBody>
+          <a:bodyPr lIns="72000" tIns="36000" rIns="72000" bIns="72000" rtlCol="0" anchor="t"/>
+          <a:lstStyle/>
+          <a:p>
+            <a:pPr algn="ctr"/>
+            <a:r>
+              <a:rPr lang="en-US" sz="1100" b="1" dirty="0">
+                <a:solidFill>
+                  <a:schemeClr val="tx1">
+                    <a:lumMod val="65000"/>
+                    <a:lumOff val="35000"/>
+                  </a:schemeClr>
+                </a:solidFill>
+                <a:ea typeface="Arial" charset="0"/>
+                <a:cs typeface="Arial" charset="0"/>
+                <a:sym typeface="Arial"/>
+              </a:rPr>
+              <a:t>SAP and non- SAP Applications</a:t>
+            </a:r>
+          </a:p>
+          <a:p>
+            <a:pPr algn="ctr"/>
+            <a:endParaRPr lang="en-US" sz="1400" b="1" dirty="0">
+              <a:solidFill>
+                <a:schemeClr val="tx1">
+                  <a:lumMod val="65000"/>
+                  <a:lumOff val="35000"/>
+                </a:schemeClr>
+              </a:solidFill>
+              <a:ea typeface="Arial" charset="0"/>
+              <a:cs typeface="Arial" charset="0"/>
+              <a:sym typeface="Arial"/>
+            </a:endParaRPr>
+          </a:p>
+          <a:p>
+            <a:pPr marL="342900" indent="-342900" algn="ctr">
+              <a:buFont typeface="Wingdings" panose="05000000000000000000" pitchFamily="2" charset="2"/>
+              <a:buChar char="§"/>
+            </a:pPr>
+            <a:endParaRPr lang="en-US" sz="1100" dirty="0">
+              <a:sym typeface="Arial"/>
+            </a:endParaRPr>
+          </a:p>
+          <a:p>
+            <a:pPr algn="ctr"/>
+            <a:endParaRPr lang="en-US" sz="1600" b="1" dirty="0">
+              <a:solidFill>
+                <a:schemeClr val="tx1"/>
+              </a:solidFill>
+              <a:ea typeface="Arial" charset="0"/>
+              <a:cs typeface="Arial" charset="0"/>
+              <a:sym typeface="Arial"/>
+            </a:endParaRPr>
+          </a:p>
+          <a:p>
+            <a:pPr algn="ctr"/>
+            <a:endParaRPr lang="en-US" sz="1600" dirty="0">
+              <a:solidFill>
+                <a:schemeClr val="tx1"/>
+              </a:solidFill>
+              <a:ea typeface="Arial" charset="0"/>
+              <a:cs typeface="Arial" charset="0"/>
+              <a:sym typeface="Arial"/>
+            </a:endParaRPr>
+          </a:p>
+        </p:txBody>
+      </p:sp>
+      <p:sp>
+        <p:nvSpPr>
+          <p:cNvPr id="9" name="Shape 2158">
+            <a:extLst>
+              <a:ext uri="{FF2B5EF4-FFF2-40B4-BE49-F238E27FC236}">
+                <a16:creationId xmlns:a16="http://schemas.microsoft.com/office/drawing/2014/main" id="{019B456C-450F-9C42-9E79-34192DAB889F}"/>
+              </a:ext>
+            </a:extLst>
+          </p:cNvPr>
+          <p:cNvSpPr/>
+          <p:nvPr/>
+        </p:nvSpPr>
+        <p:spPr>
+          <a:xfrm>
+            <a:off x="1941389" y="2614415"/>
+            <a:ext cx="1848948" cy="2009321"/>
+          </a:xfrm>
+          <a:prstGeom prst="roundRect">
+            <a:avLst>
+              <a:gd name="adj" fmla="val 399"/>
+            </a:avLst>
+          </a:prstGeom>
+          <a:noFill/>
+          <a:ln w="19050" cap="rnd">
+            <a:solidFill>
+              <a:srgbClr val="1A9898"/>
+            </a:solidFill>
+          </a:ln>
+        </p:spPr>
+        <p:style>
+          <a:lnRef idx="2">
+            <a:schemeClr val="accent1">
+              <a:shade val="50000"/>
+            </a:schemeClr>
+          </a:lnRef>
+          <a:fillRef idx="1">
+            <a:schemeClr val="accent1"/>
+          </a:fillRef>
+          <a:effectRef idx="0">
+            <a:schemeClr val="accent1"/>
+          </a:effectRef>
+          <a:fontRef idx="minor">
+            <a:schemeClr val="lt1"/>
+          </a:fontRef>
+        </p:style>
+        <p:txBody>
+          <a:bodyPr lIns="36000" tIns="36000" rIns="36000" bIns="36000" rtlCol="0" anchor="t"/>
+          <a:lstStyle/>
+          <a:p>
+            <a:r>
+              <a:rPr lang="en-US" sz="1100" b="1" dirty="0">
+                <a:solidFill>
+                  <a:schemeClr val="tx1">
+                    <a:lumMod val="65000"/>
+                    <a:lumOff val="35000"/>
+                  </a:schemeClr>
+                </a:solidFill>
+                <a:ea typeface="Arial" charset="0"/>
+                <a:cs typeface="Arial" charset="0"/>
+                <a:sym typeface="Arial"/>
+              </a:rPr>
+              <a:t>SAP Leonardo </a:t>
+            </a:r>
+            <a:r>
+              <a:rPr lang="en-US" sz="1100" b="1" dirty="0" err="1">
+                <a:solidFill>
+                  <a:schemeClr val="tx1">
+                    <a:lumMod val="65000"/>
+                    <a:lumOff val="35000"/>
+                  </a:schemeClr>
+                </a:solidFill>
+                <a:ea typeface="Arial" charset="0"/>
+                <a:cs typeface="Arial" charset="0"/>
+                <a:sym typeface="Arial"/>
+              </a:rPr>
+              <a:t>IoT</a:t>
+            </a:r>
+            <a:r>
+              <a:rPr lang="en-US" sz="1100" b="1" dirty="0">
+                <a:solidFill>
+                  <a:schemeClr val="tx1">
+                    <a:lumMod val="65000"/>
+                    <a:lumOff val="35000"/>
+                  </a:schemeClr>
+                </a:solidFill>
+                <a:ea typeface="Arial" charset="0"/>
+                <a:cs typeface="Arial" charset="0"/>
+                <a:sym typeface="Arial"/>
+              </a:rPr>
+              <a:t> Edge</a:t>
+            </a:r>
+            <a:endParaRPr lang="en-US" sz="1100" dirty="0">
+              <a:sym typeface="Arial"/>
+            </a:endParaRPr>
+          </a:p>
+          <a:p>
+            <a:pPr algn="ctr"/>
+            <a:endParaRPr lang="en-US" sz="1600" b="1" dirty="0">
+              <a:solidFill>
+                <a:schemeClr val="tx1"/>
+              </a:solidFill>
+              <a:ea typeface="Arial" charset="0"/>
+              <a:cs typeface="Arial" charset="0"/>
+              <a:sym typeface="Arial"/>
+            </a:endParaRPr>
+          </a:p>
+          <a:p>
+            <a:pPr algn="ctr"/>
+            <a:endParaRPr lang="en-US" sz="1600" dirty="0">
+              <a:solidFill>
+                <a:schemeClr val="tx1"/>
+              </a:solidFill>
+              <a:ea typeface="Arial" charset="0"/>
+              <a:cs typeface="Arial" charset="0"/>
+              <a:sym typeface="Arial"/>
+            </a:endParaRPr>
+          </a:p>
+        </p:txBody>
+      </p:sp>
+      <p:sp>
+        <p:nvSpPr>
+          <p:cNvPr id="10" name="TextBox 43">
+            <a:extLst>
+              <a:ext uri="{FF2B5EF4-FFF2-40B4-BE49-F238E27FC236}">
+                <a16:creationId xmlns:a16="http://schemas.microsoft.com/office/drawing/2014/main" id="{1BA55543-AABF-BA4C-975F-5D2395A224A9}"/>
+              </a:ext>
+            </a:extLst>
+          </p:cNvPr>
+          <p:cNvSpPr txBox="1"/>
+          <p:nvPr/>
+        </p:nvSpPr>
+        <p:spPr>
+          <a:xfrm>
+            <a:off x="10198456" y="4369281"/>
+            <a:ext cx="774072" cy="169238"/>
+          </a:xfrm>
+          <a:prstGeom prst="rect">
+            <a:avLst/>
+          </a:prstGeom>
+          <a:noFill/>
+        </p:spPr>
+        <p:txBody>
+          <a:bodyPr wrap="none" lIns="0" tIns="0" rIns="0" bIns="0" rtlCol="0">
+            <a:spAutoFit/>
+          </a:bodyPr>
+          <a:lstStyle/>
+          <a:p>
+            <a:pPr fontAlgn="base">
+              <a:spcBef>
+                <a:spcPct val="50000"/>
+              </a:spcBef>
+              <a:spcAft>
+                <a:spcPct val="0"/>
+              </a:spcAft>
+              <a:buClr>
+                <a:srgbClr val="F0AB00"/>
+              </a:buClr>
+              <a:buSzPct val="80000"/>
+            </a:pPr>
+            <a:r>
+              <a:rPr lang="en-US" sz="1100" kern="0" dirty="0">
+                <a:solidFill>
+                  <a:schemeClr val="tx1">
+                    <a:lumMod val="65000"/>
+                    <a:lumOff val="35000"/>
+                  </a:schemeClr>
+                </a:solidFill>
+                <a:latin typeface="+mn-lt"/>
+                <a:ea typeface="Arial Unicode MS" pitchFamily="34" charset="-128"/>
+                <a:cs typeface="Arial Unicode MS" pitchFamily="34" charset="-128"/>
+              </a:rPr>
+              <a:t>and more …</a:t>
+            </a:r>
+          </a:p>
+        </p:txBody>
+      </p:sp>
+      <p:sp>
+        <p:nvSpPr>
+          <p:cNvPr id="11" name="TextBox 44">
+            <a:extLst>
+              <a:ext uri="{FF2B5EF4-FFF2-40B4-BE49-F238E27FC236}">
+                <a16:creationId xmlns:a16="http://schemas.microsoft.com/office/drawing/2014/main" id="{2F349553-E994-F144-B8B6-956D3E71C6B9}"/>
+              </a:ext>
+            </a:extLst>
+          </p:cNvPr>
+          <p:cNvSpPr txBox="1"/>
+          <p:nvPr/>
+        </p:nvSpPr>
+        <p:spPr>
+          <a:xfrm>
+            <a:off x="509271" y="3989449"/>
+            <a:ext cx="831215" cy="553998"/>
+          </a:xfrm>
+          <a:prstGeom prst="rect">
+            <a:avLst/>
+          </a:prstGeom>
+          <a:noFill/>
+        </p:spPr>
+        <p:txBody>
+          <a:bodyPr wrap="square" lIns="0" tIns="0" rIns="0" bIns="0" rtlCol="0">
+            <a:spAutoFit/>
+          </a:bodyPr>
+          <a:lstStyle/>
+          <a:p>
+            <a:pPr fontAlgn="base">
+              <a:spcBef>
+                <a:spcPct val="50000"/>
+              </a:spcBef>
+              <a:spcAft>
+                <a:spcPct val="0"/>
+              </a:spcAft>
+              <a:buClr>
+                <a:srgbClr val="F0AB00"/>
+              </a:buClr>
+              <a:buSzPct val="80000"/>
+            </a:pPr>
+            <a:r>
+              <a:rPr lang="en-US" sz="1200" i="1" kern="0" dirty="0">
+                <a:solidFill>
+                  <a:schemeClr val="tx1">
+                    <a:lumMod val="65000"/>
+                    <a:lumOff val="35000"/>
+                  </a:schemeClr>
+                </a:solidFill>
+                <a:latin typeface="+mn-lt"/>
+                <a:ea typeface="Arial Unicode MS" pitchFamily="34" charset="-128"/>
+                <a:cs typeface="Arial Unicode MS" pitchFamily="34" charset="-128"/>
+              </a:rPr>
+              <a:t>Sensor</a:t>
+            </a:r>
+            <a:br>
+              <a:rPr lang="en-US" sz="1200" i="1" kern="0" dirty="0">
+                <a:solidFill>
+                  <a:schemeClr val="tx1">
+                    <a:lumMod val="65000"/>
+                    <a:lumOff val="35000"/>
+                  </a:schemeClr>
+                </a:solidFill>
+                <a:latin typeface="+mn-lt"/>
+                <a:ea typeface="Arial Unicode MS" pitchFamily="34" charset="-128"/>
+                <a:cs typeface="Arial Unicode MS" pitchFamily="34" charset="-128"/>
+              </a:rPr>
+            </a:br>
+            <a:r>
+              <a:rPr lang="en-US" sz="1200" i="1" kern="0" dirty="0">
+                <a:solidFill>
+                  <a:schemeClr val="tx1">
+                    <a:lumMod val="65000"/>
+                    <a:lumOff val="35000"/>
+                  </a:schemeClr>
+                </a:solidFill>
+                <a:latin typeface="+mn-lt"/>
+                <a:ea typeface="Arial Unicode MS" pitchFamily="34" charset="-128"/>
+                <a:cs typeface="Arial Unicode MS" pitchFamily="34" charset="-128"/>
+              </a:rPr>
+              <a:t>embedded</a:t>
+            </a:r>
+            <a:br>
+              <a:rPr lang="en-US" sz="1200" i="1" kern="0" dirty="0">
+                <a:solidFill>
+                  <a:schemeClr val="tx1">
+                    <a:lumMod val="65000"/>
+                    <a:lumOff val="35000"/>
+                  </a:schemeClr>
+                </a:solidFill>
+                <a:latin typeface="+mn-lt"/>
+                <a:ea typeface="Arial Unicode MS" pitchFamily="34" charset="-128"/>
+                <a:cs typeface="Arial Unicode MS" pitchFamily="34" charset="-128"/>
+              </a:rPr>
+            </a:br>
+            <a:r>
+              <a:rPr lang="en-US" sz="1200" i="1" kern="0" dirty="0">
+                <a:solidFill>
+                  <a:schemeClr val="tx1">
+                    <a:lumMod val="65000"/>
+                    <a:lumOff val="35000"/>
+                  </a:schemeClr>
+                </a:solidFill>
+                <a:latin typeface="+mn-lt"/>
+                <a:ea typeface="Arial Unicode MS" pitchFamily="34" charset="-128"/>
+                <a:cs typeface="Arial Unicode MS" pitchFamily="34" charset="-128"/>
+              </a:rPr>
+              <a:t>things</a:t>
+            </a:r>
+          </a:p>
+        </p:txBody>
+      </p:sp>
+      <p:sp>
+        <p:nvSpPr>
+          <p:cNvPr id="12" name="Rechteck 9">
+            <a:extLst>
+              <a:ext uri="{FF2B5EF4-FFF2-40B4-BE49-F238E27FC236}">
+                <a16:creationId xmlns:a16="http://schemas.microsoft.com/office/drawing/2014/main" id="{10AF2AA2-7971-2749-B2C9-F966DBFF4C82}"/>
+              </a:ext>
+            </a:extLst>
+          </p:cNvPr>
+          <p:cNvSpPr/>
+          <p:nvPr/>
+        </p:nvSpPr>
+        <p:spPr>
+          <a:xfrm>
+            <a:off x="4272017" y="1179323"/>
+            <a:ext cx="5297282" cy="4464522"/>
+          </a:xfrm>
+          <a:prstGeom prst="rect">
+            <a:avLst/>
+          </a:prstGeom>
+          <a:noFill/>
+          <a:ln w="19050">
+            <a:solidFill>
+              <a:srgbClr val="427CAC"/>
+            </a:solidFill>
+          </a:ln>
+        </p:spPr>
+        <p:style>
+          <a:lnRef idx="2">
+            <a:schemeClr val="accent1">
+              <a:shade val="50000"/>
+            </a:schemeClr>
+          </a:lnRef>
+          <a:fillRef idx="1">
+            <a:schemeClr val="accent1"/>
+          </a:fillRef>
+          <a:effectRef idx="0">
+            <a:schemeClr val="accent1"/>
+          </a:effectRef>
+          <a:fontRef idx="minor">
+            <a:schemeClr val="lt1"/>
+          </a:fontRef>
+        </p:style>
+        <p:txBody>
+          <a:bodyPr lIns="72000" tIns="72000" rIns="72000" bIns="72000" rtlCol="0" anchor="t"/>
+          <a:lstStyle/>
+          <a:p>
+            <a:endParaRPr lang="en-US" sz="1800" b="1" dirty="0">
+              <a:solidFill>
+                <a:schemeClr val="tx1">
+                  <a:lumMod val="65000"/>
+                  <a:lumOff val="35000"/>
+                </a:schemeClr>
+              </a:solidFill>
+            </a:endParaRPr>
+          </a:p>
+        </p:txBody>
+      </p:sp>
+      <p:sp>
+        <p:nvSpPr>
+          <p:cNvPr id="13" name="Shape 2158">
+            <a:extLst>
+              <a:ext uri="{FF2B5EF4-FFF2-40B4-BE49-F238E27FC236}">
+                <a16:creationId xmlns:a16="http://schemas.microsoft.com/office/drawing/2014/main" id="{8408C44F-1F81-A44A-BB4A-2B74829FF7A9}"/>
+              </a:ext>
+            </a:extLst>
+          </p:cNvPr>
+          <p:cNvSpPr/>
+          <p:nvPr/>
+        </p:nvSpPr>
+        <p:spPr>
+          <a:xfrm>
+            <a:off x="4552783" y="2945805"/>
+            <a:ext cx="3793216" cy="1527901"/>
+          </a:xfrm>
+          <a:prstGeom prst="roundRect">
+            <a:avLst>
+              <a:gd name="adj" fmla="val 399"/>
+            </a:avLst>
+          </a:prstGeom>
+          <a:noFill/>
+          <a:ln w="19050" cap="rnd">
+            <a:solidFill>
+              <a:srgbClr val="1A9898"/>
+            </a:solidFill>
+            <a:prstDash val="solid"/>
+          </a:ln>
+        </p:spPr>
+        <p:style>
+          <a:lnRef idx="2">
+            <a:schemeClr val="accent1">
+              <a:shade val="50000"/>
+            </a:schemeClr>
+          </a:lnRef>
+          <a:fillRef idx="1">
+            <a:schemeClr val="accent1"/>
+          </a:fillRef>
+          <a:effectRef idx="0">
+            <a:schemeClr val="accent1"/>
+          </a:effectRef>
+          <a:fontRef idx="minor">
+            <a:schemeClr val="lt1"/>
+          </a:fontRef>
+        </p:style>
+        <p:txBody>
+          <a:bodyPr lIns="36000" tIns="36000" rIns="36000" bIns="36000" rtlCol="0" anchor="t"/>
+          <a:lstStyle/>
+          <a:p>
+            <a:r>
+              <a:rPr lang="en-US" sz="1100" b="1" dirty="0">
+                <a:solidFill>
+                  <a:schemeClr val="tx1">
+                    <a:lumMod val="65000"/>
+                    <a:lumOff val="35000"/>
+                  </a:schemeClr>
+                </a:solidFill>
+                <a:ea typeface="Arial" charset="0"/>
+                <a:cs typeface="Arial" charset="0"/>
+                <a:sym typeface="Arial"/>
+              </a:rPr>
+              <a:t>SAP Leonardo </a:t>
+            </a:r>
+            <a:r>
+              <a:rPr lang="en-US" sz="1100" b="1" dirty="0" err="1">
+                <a:solidFill>
+                  <a:schemeClr val="tx1">
+                    <a:lumMod val="65000"/>
+                    <a:lumOff val="35000"/>
+                  </a:schemeClr>
+                </a:solidFill>
+                <a:ea typeface="Arial" charset="0"/>
+                <a:cs typeface="Arial" charset="0"/>
+                <a:sym typeface="Arial"/>
+              </a:rPr>
+              <a:t>IoT</a:t>
+            </a:r>
+            <a:r>
+              <a:rPr lang="en-US" sz="1100" b="1" dirty="0">
+                <a:solidFill>
+                  <a:schemeClr val="tx1">
+                    <a:lumMod val="65000"/>
+                    <a:lumOff val="35000"/>
+                  </a:schemeClr>
+                </a:solidFill>
+                <a:ea typeface="Arial" charset="0"/>
+                <a:cs typeface="Arial" charset="0"/>
+                <a:sym typeface="Arial"/>
+              </a:rPr>
+              <a:t> Foundation</a:t>
+            </a:r>
+          </a:p>
+        </p:txBody>
+      </p:sp>
+      <p:sp>
+        <p:nvSpPr>
+          <p:cNvPr id="14" name="Shape 2158">
+            <a:extLst>
+              <a:ext uri="{FF2B5EF4-FFF2-40B4-BE49-F238E27FC236}">
+                <a16:creationId xmlns:a16="http://schemas.microsoft.com/office/drawing/2014/main" id="{A424B3F3-E597-2849-B505-F7EB8C104E19}"/>
+              </a:ext>
+            </a:extLst>
+          </p:cNvPr>
+          <p:cNvSpPr/>
+          <p:nvPr/>
+        </p:nvSpPr>
+        <p:spPr>
+          <a:xfrm>
+            <a:off x="5798678" y="1503956"/>
+            <a:ext cx="1493686" cy="262822"/>
+          </a:xfrm>
+          <a:prstGeom prst="roundRect">
+            <a:avLst>
+              <a:gd name="adj" fmla="val 399"/>
+            </a:avLst>
+          </a:prstGeom>
+          <a:noFill/>
+          <a:ln w="19050" cap="rnd">
+            <a:noFill/>
+            <a:prstDash val="sysDot"/>
+          </a:ln>
+        </p:spPr>
+        <p:style>
+          <a:lnRef idx="2">
+            <a:schemeClr val="accent1">
+              <a:shade val="50000"/>
+            </a:schemeClr>
+          </a:lnRef>
+          <a:fillRef idx="1">
+            <a:schemeClr val="accent1"/>
+          </a:fillRef>
+          <a:effectRef idx="0">
+            <a:schemeClr val="accent1"/>
+          </a:effectRef>
+          <a:fontRef idx="minor">
+            <a:schemeClr val="lt1"/>
+          </a:fontRef>
+        </p:style>
+        <p:txBody>
+          <a:bodyPr lIns="72000" tIns="72000" rIns="72000" bIns="72000" rtlCol="0" anchor="ctr" anchorCtr="0"/>
+          <a:lstStyle/>
+          <a:p>
+            <a:pPr algn="ctr" fontAlgn="base">
+              <a:spcBef>
+                <a:spcPts val="600"/>
+              </a:spcBef>
+              <a:spcAft>
+                <a:spcPct val="0"/>
+              </a:spcAft>
+              <a:buClr>
+                <a:srgbClr val="F0AB00"/>
+              </a:buClr>
+              <a:buSzPct val="80000"/>
+            </a:pPr>
+            <a:r>
+              <a:rPr lang="en-US" sz="1100" b="1" kern="0" dirty="0">
+                <a:solidFill>
+                  <a:srgbClr val="1A9898"/>
+                </a:solidFill>
+                <a:ea typeface="BentonSans" charset="0"/>
+                <a:cs typeface="BentonSans" charset="0"/>
+              </a:rPr>
+              <a:t>Your IoT application</a:t>
+            </a:r>
+            <a:endParaRPr lang="en-US" sz="1100" b="1" kern="0" dirty="0">
+              <a:solidFill>
+                <a:srgbClr val="1A9898"/>
+              </a:solidFill>
+              <a:ea typeface="BentonSans" charset="0"/>
+              <a:cs typeface="BentonSans" charset="0"/>
+              <a:sym typeface="Arial"/>
+            </a:endParaRPr>
+          </a:p>
+        </p:txBody>
+      </p:sp>
+      <p:cxnSp>
+        <p:nvCxnSpPr>
+          <p:cNvPr id="15" name="Straight Connector 48">
+            <a:extLst>
+              <a:ext uri="{FF2B5EF4-FFF2-40B4-BE49-F238E27FC236}">
+                <a16:creationId xmlns:a16="http://schemas.microsoft.com/office/drawing/2014/main" id="{B556A1CF-F7F7-8940-9F68-F443D48D5E12}"/>
+              </a:ext>
+            </a:extLst>
+          </p:cNvPr>
+          <p:cNvCxnSpPr>
+            <a:cxnSpLocks/>
+            <a:stCxn id="18" idx="2"/>
+            <a:endCxn id="13" idx="0"/>
+          </p:cNvCxnSpPr>
+          <p:nvPr/>
+        </p:nvCxnSpPr>
+        <p:spPr>
+          <a:xfrm flipH="1">
+            <a:off x="6449391" y="2153925"/>
+            <a:ext cx="3949" cy="791880"/>
+          </a:xfrm>
+          <a:prstGeom prst="line">
+            <a:avLst/>
+          </a:prstGeom>
+          <a:ln w="19050" cap="rnd" cmpd="sng">
+            <a:solidFill>
+              <a:schemeClr val="tx1">
+                <a:lumMod val="65000"/>
+                <a:lumOff val="35000"/>
+              </a:schemeClr>
+            </a:solidFill>
+            <a:round/>
+            <a:headEnd type="none" w="med" len="med"/>
+            <a:tailEnd type="none" w="med" len="med"/>
+          </a:ln>
+        </p:spPr>
+        <p:style>
+          <a:lnRef idx="1">
+            <a:schemeClr val="accent1"/>
+          </a:lnRef>
+          <a:fillRef idx="0">
+            <a:schemeClr val="accent1"/>
+          </a:fillRef>
+          <a:effectRef idx="0">
+            <a:schemeClr val="accent1"/>
+          </a:effectRef>
+          <a:fontRef idx="minor">
+            <a:schemeClr val="tx1"/>
+          </a:fontRef>
+        </p:style>
+      </p:cxnSp>
+      <p:sp>
+        <p:nvSpPr>
+          <p:cNvPr id="16" name="Shape 2158">
+            <a:extLst>
+              <a:ext uri="{FF2B5EF4-FFF2-40B4-BE49-F238E27FC236}">
+                <a16:creationId xmlns:a16="http://schemas.microsoft.com/office/drawing/2014/main" id="{9BD5E1B2-1A8F-CE49-A0CD-310F952B8085}"/>
+              </a:ext>
+            </a:extLst>
+          </p:cNvPr>
+          <p:cNvSpPr/>
+          <p:nvPr/>
+        </p:nvSpPr>
+        <p:spPr>
+          <a:xfrm>
+            <a:off x="1824970" y="2286075"/>
+            <a:ext cx="7600311" cy="2441170"/>
+          </a:xfrm>
+          <a:prstGeom prst="roundRect">
+            <a:avLst>
+              <a:gd name="adj" fmla="val 399"/>
+            </a:avLst>
+          </a:prstGeom>
+          <a:noFill/>
+          <a:ln w="19050" cap="rnd">
+            <a:solidFill>
+              <a:srgbClr val="1A9898"/>
+            </a:solidFill>
+            <a:prstDash val="sysDot"/>
+          </a:ln>
+        </p:spPr>
+        <p:style>
+          <a:lnRef idx="2">
+            <a:schemeClr val="accent1">
+              <a:shade val="50000"/>
+            </a:schemeClr>
+          </a:lnRef>
+          <a:fillRef idx="1">
+            <a:schemeClr val="accent1"/>
+          </a:fillRef>
+          <a:effectRef idx="0">
+            <a:schemeClr val="accent1"/>
+          </a:effectRef>
+          <a:fontRef idx="minor">
+            <a:schemeClr val="lt1"/>
+          </a:fontRef>
+        </p:style>
+        <p:txBody>
+          <a:bodyPr lIns="36000" tIns="36000" rIns="36000" bIns="36000" rtlCol="0" anchor="t"/>
+          <a:lstStyle/>
+          <a:p>
+            <a:r>
+              <a:rPr lang="en-US" sz="1200" dirty="0">
+                <a:solidFill>
+                  <a:schemeClr val="tx1">
+                    <a:lumMod val="65000"/>
+                    <a:lumOff val="35000"/>
+                  </a:schemeClr>
+                </a:solidFill>
+                <a:ea typeface="Arial" charset="0"/>
+                <a:cs typeface="Arial" charset="0"/>
+                <a:sym typeface="Arial"/>
+              </a:rPr>
+              <a:t>SAP Leonardo </a:t>
+            </a:r>
+            <a:r>
+              <a:rPr lang="en-US" sz="1200" dirty="0" err="1">
+                <a:solidFill>
+                  <a:schemeClr val="tx1">
+                    <a:lumMod val="65000"/>
+                    <a:lumOff val="35000"/>
+                  </a:schemeClr>
+                </a:solidFill>
+                <a:ea typeface="Arial" charset="0"/>
+                <a:cs typeface="Arial" charset="0"/>
+                <a:sym typeface="Arial"/>
+              </a:rPr>
+              <a:t>IoT</a:t>
+            </a:r>
+            <a:endParaRPr lang="en-US" sz="1200" dirty="0">
+              <a:solidFill>
+                <a:schemeClr val="tx1">
+                  <a:lumMod val="65000"/>
+                  <a:lumOff val="35000"/>
+                </a:schemeClr>
+              </a:solidFill>
+              <a:ea typeface="Arial" charset="0"/>
+              <a:cs typeface="Arial" charset="0"/>
+              <a:sym typeface="Arial"/>
+            </a:endParaRPr>
+          </a:p>
+        </p:txBody>
+      </p:sp>
+      <p:cxnSp>
+        <p:nvCxnSpPr>
+          <p:cNvPr id="17" name="Straight Connector 50">
+            <a:extLst>
+              <a:ext uri="{FF2B5EF4-FFF2-40B4-BE49-F238E27FC236}">
+                <a16:creationId xmlns:a16="http://schemas.microsoft.com/office/drawing/2014/main" id="{1C797119-5879-AF49-885D-FA6364D61786}"/>
+              </a:ext>
+            </a:extLst>
+          </p:cNvPr>
+          <p:cNvCxnSpPr>
+            <a:cxnSpLocks/>
+            <a:stCxn id="13" idx="3"/>
+          </p:cNvCxnSpPr>
+          <p:nvPr/>
+        </p:nvCxnSpPr>
+        <p:spPr>
+          <a:xfrm>
+            <a:off x="8345999" y="3709756"/>
+            <a:ext cx="1569866" cy="0"/>
+          </a:xfrm>
+          <a:prstGeom prst="line">
+            <a:avLst/>
+          </a:prstGeom>
+          <a:ln w="19050" cap="rnd" cmpd="sng">
+            <a:solidFill>
+              <a:schemeClr val="tx1">
+                <a:lumMod val="65000"/>
+                <a:lumOff val="35000"/>
+              </a:schemeClr>
+            </a:solidFill>
+            <a:round/>
+            <a:headEnd type="none" w="med" len="med"/>
+            <a:tailEnd type="none" w="med" len="med"/>
+          </a:ln>
+        </p:spPr>
+        <p:style>
+          <a:lnRef idx="1">
+            <a:schemeClr val="accent1"/>
+          </a:lnRef>
+          <a:fillRef idx="0">
+            <a:schemeClr val="accent1"/>
+          </a:fillRef>
+          <a:effectRef idx="0">
+            <a:schemeClr val="accent1"/>
+          </a:effectRef>
+          <a:fontRef idx="minor">
+            <a:schemeClr val="tx1"/>
+          </a:fontRef>
+        </p:style>
+      </p:cxnSp>
+      <p:pic>
+        <p:nvPicPr>
+          <p:cNvPr id="18" name="Bild 8">
+            <a:extLst>
+              <a:ext uri="{FF2B5EF4-FFF2-40B4-BE49-F238E27FC236}">
+                <a16:creationId xmlns:a16="http://schemas.microsoft.com/office/drawing/2014/main" id="{534D8B3C-113F-6A4F-83A0-710C551F718F}"/>
+              </a:ext>
+            </a:extLst>
+          </p:cNvPr>
+          <p:cNvPicPr>
+            <a:picLocks noChangeAspect="1"/>
+          </p:cNvPicPr>
+          <p:nvPr/>
+        </p:nvPicPr>
+        <p:blipFill>
+          <a:blip r:embed="rId2">
+            <a:extLst>
+              <a:ext uri="{28A0092B-C50C-407E-A947-70E740481C1C}">
+                <a14:useLocalDpi xmlns:a14="http://schemas.microsoft.com/office/drawing/2010/main" val="0"/>
+              </a:ext>
+            </a:extLst>
+          </a:blip>
+          <a:stretch>
+            <a:fillRect/>
+          </a:stretch>
+        </p:blipFill>
+        <p:spPr>
+          <a:xfrm>
+            <a:off x="6273340" y="1793925"/>
+            <a:ext cx="360000" cy="360000"/>
+          </a:xfrm>
+          <a:prstGeom prst="rect">
+            <a:avLst/>
+          </a:prstGeom>
+        </p:spPr>
+      </p:pic>
+      <p:grpSp>
+        <p:nvGrpSpPr>
+          <p:cNvPr id="19" name="Gruppierung 7">
+            <a:extLst>
+              <a:ext uri="{FF2B5EF4-FFF2-40B4-BE49-F238E27FC236}">
+                <a16:creationId xmlns:a16="http://schemas.microsoft.com/office/drawing/2014/main" id="{B164106C-2056-934A-8E31-4AED5A9A0976}"/>
+              </a:ext>
+            </a:extLst>
+          </p:cNvPr>
+          <p:cNvGrpSpPr/>
+          <p:nvPr/>
+        </p:nvGrpSpPr>
+        <p:grpSpPr>
+          <a:xfrm>
+            <a:off x="8441046" y="3308330"/>
+            <a:ext cx="1041770" cy="1185592"/>
+            <a:chOff x="2871673" y="2333281"/>
+            <a:chExt cx="1041770" cy="1185592"/>
+          </a:xfrm>
+        </p:grpSpPr>
+        <p:sp>
+          <p:nvSpPr>
+            <p:cNvPr id="20" name="Rechteck 42">
+              <a:extLst>
+                <a:ext uri="{FF2B5EF4-FFF2-40B4-BE49-F238E27FC236}">
+                  <a16:creationId xmlns:a16="http://schemas.microsoft.com/office/drawing/2014/main" id="{7501801B-A2EE-1C49-BD9E-05487515D8E0}"/>
+                </a:ext>
+              </a:extLst>
+            </p:cNvPr>
+            <p:cNvSpPr/>
+            <p:nvPr/>
+          </p:nvSpPr>
+          <p:spPr>
+            <a:xfrm>
+              <a:off x="2871673" y="3011042"/>
+              <a:ext cx="1041770" cy="507831"/>
+            </a:xfrm>
+            <a:prstGeom prst="rect">
+              <a:avLst/>
+            </a:prstGeom>
+          </p:spPr>
+          <p:txBody>
+            <a:bodyPr wrap="square" lIns="0" tIns="0" rIns="0" bIns="0">
+              <a:spAutoFit/>
+            </a:bodyPr>
+            <a:lstStyle/>
+            <a:p>
+              <a:pPr algn="ctr"/>
+              <a:r>
+                <a:rPr lang="en-US" sz="1100" b="1" dirty="0">
+                  <a:solidFill>
+                    <a:srgbClr val="427CAC"/>
+                  </a:solidFill>
+                  <a:latin typeface="+mn-lt"/>
+                </a:rPr>
+                <a:t>SAP Cloud</a:t>
+              </a:r>
+              <a:br>
+                <a:rPr lang="en-US" sz="1100" b="1" dirty="0">
+                  <a:solidFill>
+                    <a:srgbClr val="427CAC"/>
+                  </a:solidFill>
+                  <a:latin typeface="+mn-lt"/>
+                </a:rPr>
+              </a:br>
+              <a:r>
+                <a:rPr lang="en-US" sz="1100" b="1" dirty="0">
+                  <a:solidFill>
+                    <a:srgbClr val="427CAC"/>
+                  </a:solidFill>
+                  <a:latin typeface="+mn-lt"/>
+                </a:rPr>
+                <a:t>Platform Integration</a:t>
+              </a:r>
+              <a:endParaRPr lang="en-US" sz="1100" b="1" dirty="0">
+                <a:solidFill>
+                  <a:srgbClr val="427CAC"/>
+                </a:solidFill>
+                <a:latin typeface="+mn-lt"/>
+                <a:ea typeface="Arial" charset="0"/>
+                <a:cs typeface="Arial" charset="0"/>
+              </a:endParaRPr>
+            </a:p>
+          </p:txBody>
+        </p:sp>
+        <p:pic>
+          <p:nvPicPr>
+            <p:cNvPr id="21" name="Bild 54">
+              <a:extLst>
+                <a:ext uri="{FF2B5EF4-FFF2-40B4-BE49-F238E27FC236}">
+                  <a16:creationId xmlns:a16="http://schemas.microsoft.com/office/drawing/2014/main" id="{5A6873EC-F5F1-864B-983B-CCE7B9E4A15D}"/>
+                </a:ext>
+              </a:extLst>
+            </p:cNvPr>
+            <p:cNvPicPr>
+              <a:picLocks noChangeAspect="1"/>
+            </p:cNvPicPr>
+            <p:nvPr/>
+          </p:nvPicPr>
+          <p:blipFill>
+            <a:blip r:embed="rId3">
+              <a:extLst>
+                <a:ext uri="{28A0092B-C50C-407E-A947-70E740481C1C}">
+                  <a14:useLocalDpi xmlns:a14="http://schemas.microsoft.com/office/drawing/2010/main" val="0"/>
+                </a:ext>
+              </a:extLst>
+            </a:blip>
+            <a:stretch>
+              <a:fillRect/>
+            </a:stretch>
+          </p:blipFill>
+          <p:spPr>
+            <a:xfrm>
+              <a:off x="3048681" y="2333281"/>
+              <a:ext cx="720000" cy="720000"/>
+            </a:xfrm>
+            <a:prstGeom prst="ellipse">
+              <a:avLst/>
+            </a:prstGeom>
+            <a:solidFill>
+              <a:schemeClr val="bg1"/>
+            </a:solidFill>
+          </p:spPr>
+        </p:pic>
+      </p:grpSp>
+      <p:sp>
+        <p:nvSpPr>
+          <p:cNvPr id="22" name="Rechteck 85">
+            <a:extLst>
+              <a:ext uri="{FF2B5EF4-FFF2-40B4-BE49-F238E27FC236}">
+                <a16:creationId xmlns:a16="http://schemas.microsoft.com/office/drawing/2014/main" id="{E5F007D8-A234-0F42-BA23-DD2375598378}"/>
+              </a:ext>
+            </a:extLst>
+          </p:cNvPr>
+          <p:cNvSpPr/>
+          <p:nvPr/>
+        </p:nvSpPr>
+        <p:spPr>
+          <a:xfrm>
+            <a:off x="4538065" y="3193416"/>
+            <a:ext cx="1437739" cy="507831"/>
+          </a:xfrm>
+          <a:prstGeom prst="rect">
+            <a:avLst/>
+          </a:prstGeom>
+        </p:spPr>
+        <p:txBody>
+          <a:bodyPr wrap="square" lIns="0" tIns="0" rIns="0" bIns="0">
+            <a:spAutoFit/>
+          </a:bodyPr>
+          <a:lstStyle/>
+          <a:p>
+            <a:pPr algn="ctr"/>
+            <a:r>
+              <a:rPr lang="en-US" sz="1100" b="1" dirty="0">
+                <a:solidFill>
+                  <a:srgbClr val="427CAC"/>
+                </a:solidFill>
+                <a:latin typeface="+mn-lt"/>
+                <a:ea typeface="Arial" charset="0"/>
+                <a:cs typeface="Arial" charset="0"/>
+              </a:rPr>
+              <a:t>SAP Cloud Platform Internet of Things </a:t>
+            </a:r>
+            <a:br>
+              <a:rPr lang="en-US" sz="1100" b="1" dirty="0">
+                <a:solidFill>
+                  <a:srgbClr val="427CAC"/>
+                </a:solidFill>
+                <a:latin typeface="+mn-lt"/>
+                <a:ea typeface="Arial" charset="0"/>
+                <a:cs typeface="Arial" charset="0"/>
+              </a:rPr>
+            </a:br>
+            <a:r>
+              <a:rPr lang="en-US" sz="1050" dirty="0">
+                <a:solidFill>
+                  <a:srgbClr val="427CAC"/>
+                </a:solidFill>
+                <a:latin typeface="+mn-lt"/>
+                <a:ea typeface="Arial" charset="0"/>
+                <a:cs typeface="Arial" charset="0"/>
+              </a:rPr>
+              <a:t>(Core)</a:t>
+            </a:r>
+            <a:endParaRPr lang="en-US" sz="1100" dirty="0">
+              <a:solidFill>
+                <a:srgbClr val="427CAC"/>
+              </a:solidFill>
+              <a:latin typeface="+mn-lt"/>
+              <a:ea typeface="Arial" charset="0"/>
+              <a:cs typeface="Arial" charset="0"/>
+            </a:endParaRPr>
+          </a:p>
+        </p:txBody>
+      </p:sp>
+      <p:pic>
+        <p:nvPicPr>
+          <p:cNvPr id="23" name="Bild 94">
+            <a:extLst>
+              <a:ext uri="{FF2B5EF4-FFF2-40B4-BE49-F238E27FC236}">
+                <a16:creationId xmlns:a16="http://schemas.microsoft.com/office/drawing/2014/main" id="{0DECB678-C306-1C4A-AE68-2BF21CD07750}"/>
+              </a:ext>
+            </a:extLst>
+          </p:cNvPr>
+          <p:cNvPicPr>
+            <a:picLocks noChangeAspect="1"/>
+          </p:cNvPicPr>
+          <p:nvPr/>
+        </p:nvPicPr>
+        <p:blipFill>
+          <a:blip r:embed="rId4">
+            <a:extLst>
+              <a:ext uri="{28A0092B-C50C-407E-A947-70E740481C1C}">
+                <a14:useLocalDpi xmlns:a14="http://schemas.microsoft.com/office/drawing/2010/main" val="0"/>
+              </a:ext>
+            </a:extLst>
+          </a:blip>
+          <a:stretch>
+            <a:fillRect/>
+          </a:stretch>
+        </p:blipFill>
+        <p:spPr>
+          <a:xfrm>
+            <a:off x="4896934" y="3658364"/>
+            <a:ext cx="720000" cy="720000"/>
+          </a:xfrm>
+          <a:prstGeom prst="ellipse">
+            <a:avLst/>
+          </a:prstGeom>
+        </p:spPr>
+      </p:pic>
+      <p:sp>
+        <p:nvSpPr>
+          <p:cNvPr id="24" name="Rechteck 88">
+            <a:extLst>
+              <a:ext uri="{FF2B5EF4-FFF2-40B4-BE49-F238E27FC236}">
+                <a16:creationId xmlns:a16="http://schemas.microsoft.com/office/drawing/2014/main" id="{0AE1F7B0-D4B0-AB40-9A70-ACBAFA6C55DF}"/>
+              </a:ext>
+            </a:extLst>
+          </p:cNvPr>
+          <p:cNvSpPr/>
+          <p:nvPr/>
+        </p:nvSpPr>
+        <p:spPr>
+          <a:xfrm>
+            <a:off x="6844602" y="3302705"/>
+            <a:ext cx="1569866" cy="338554"/>
+          </a:xfrm>
+          <a:prstGeom prst="rect">
+            <a:avLst/>
+          </a:prstGeom>
+        </p:spPr>
+        <p:txBody>
+          <a:bodyPr wrap="square" lIns="0" tIns="0" rIns="0" bIns="0">
+            <a:spAutoFit/>
+          </a:bodyPr>
+          <a:lstStyle/>
+          <a:p>
+            <a:pPr algn="ctr"/>
+            <a:r>
+              <a:rPr lang="en-US" sz="1100" b="1" dirty="0">
+                <a:solidFill>
+                  <a:srgbClr val="427CAC"/>
+                </a:solidFill>
+                <a:latin typeface="+mn-lt"/>
+              </a:rPr>
+              <a:t>SAP IoT Application Enablement</a:t>
+            </a:r>
+            <a:endParaRPr lang="en-US" sz="1100" b="1" dirty="0">
+              <a:solidFill>
+                <a:srgbClr val="427CAC"/>
+              </a:solidFill>
+              <a:latin typeface="+mn-lt"/>
+              <a:ea typeface="Arial" charset="0"/>
+              <a:cs typeface="Arial" charset="0"/>
+            </a:endParaRPr>
+          </a:p>
+        </p:txBody>
+      </p:sp>
+      <p:pic>
+        <p:nvPicPr>
+          <p:cNvPr id="25" name="Bild 95">
+            <a:extLst>
+              <a:ext uri="{FF2B5EF4-FFF2-40B4-BE49-F238E27FC236}">
+                <a16:creationId xmlns:a16="http://schemas.microsoft.com/office/drawing/2014/main" id="{DBB58E46-BAE3-144D-AEF4-EC83E4734BBD}"/>
+              </a:ext>
+            </a:extLst>
+          </p:cNvPr>
+          <p:cNvPicPr>
+            <a:picLocks noChangeAspect="1"/>
+          </p:cNvPicPr>
+          <p:nvPr/>
+        </p:nvPicPr>
+        <p:blipFill>
+          <a:blip r:embed="rId5">
+            <a:extLst>
+              <a:ext uri="{28A0092B-C50C-407E-A947-70E740481C1C}">
+                <a14:useLocalDpi xmlns:a14="http://schemas.microsoft.com/office/drawing/2010/main" val="0"/>
+              </a:ext>
+            </a:extLst>
+          </a:blip>
+          <a:stretch>
+            <a:fillRect/>
+          </a:stretch>
+        </p:blipFill>
+        <p:spPr>
+          <a:xfrm>
+            <a:off x="7335731" y="3664316"/>
+            <a:ext cx="720000" cy="720000"/>
+          </a:xfrm>
+          <a:prstGeom prst="ellipse">
+            <a:avLst/>
+          </a:prstGeom>
+        </p:spPr>
+      </p:pic>
+      <p:sp>
+        <p:nvSpPr>
+          <p:cNvPr id="26" name="Abgerundetes Rechteck 30">
+            <a:extLst>
+              <a:ext uri="{FF2B5EF4-FFF2-40B4-BE49-F238E27FC236}">
+                <a16:creationId xmlns:a16="http://schemas.microsoft.com/office/drawing/2014/main" id="{FF804686-7331-B845-89B7-808F2F2C290E}"/>
+              </a:ext>
+            </a:extLst>
+          </p:cNvPr>
+          <p:cNvSpPr/>
+          <p:nvPr/>
+        </p:nvSpPr>
+        <p:spPr>
+          <a:xfrm>
+            <a:off x="5171678" y="5048386"/>
+            <a:ext cx="2226986" cy="377700"/>
+          </a:xfrm>
+          <a:prstGeom prst="roundRect">
+            <a:avLst>
+              <a:gd name="adj" fmla="val 4078"/>
+            </a:avLst>
+          </a:prstGeom>
+          <a:noFill/>
+          <a:ln w="28575">
+            <a:noFill/>
+          </a:ln>
+        </p:spPr>
+        <p:style>
+          <a:lnRef idx="2">
+            <a:schemeClr val="accent1">
+              <a:shade val="50000"/>
+            </a:schemeClr>
+          </a:lnRef>
+          <a:fillRef idx="1">
+            <a:schemeClr val="accent1"/>
+          </a:fillRef>
+          <a:effectRef idx="0">
+            <a:schemeClr val="accent1"/>
+          </a:effectRef>
+          <a:fontRef idx="minor">
+            <a:schemeClr val="lt1"/>
+          </a:fontRef>
+        </p:style>
+        <p:txBody>
+          <a:bodyPr lIns="36000" tIns="36000" rIns="36000" bIns="36000" rtlCol="0" anchor="ctr"/>
+          <a:lstStyle/>
+          <a:p>
+            <a:pPr algn="r"/>
+            <a:r>
+              <a:rPr lang="en-US" sz="1100" b="1" dirty="0">
+                <a:solidFill>
+                  <a:srgbClr val="1A9898"/>
+                </a:solidFill>
+                <a:ea typeface="Arial" charset="0"/>
+                <a:cs typeface="Arial" charset="0"/>
+              </a:rPr>
+              <a:t>Your IoT Data</a:t>
+            </a:r>
+            <a:br>
+              <a:rPr lang="en-US" sz="1100" b="1" dirty="0">
+                <a:solidFill>
+                  <a:schemeClr val="tx1">
+                    <a:lumMod val="65000"/>
+                    <a:lumOff val="35000"/>
+                  </a:schemeClr>
+                </a:solidFill>
+                <a:ea typeface="Arial" charset="0"/>
+                <a:cs typeface="Arial" charset="0"/>
+              </a:rPr>
+            </a:br>
+            <a:r>
+              <a:rPr lang="en-US" sz="1100" dirty="0">
+                <a:solidFill>
+                  <a:schemeClr val="tx1">
+                    <a:lumMod val="65000"/>
+                    <a:lumOff val="35000"/>
+                  </a:schemeClr>
+                </a:solidFill>
+                <a:ea typeface="Arial" charset="0"/>
+                <a:cs typeface="Arial" charset="0"/>
+              </a:rPr>
+              <a:t>Swift I Cassandra** I SAP HANA</a:t>
+            </a:r>
+          </a:p>
+        </p:txBody>
+      </p:sp>
+      <p:pic>
+        <p:nvPicPr>
+          <p:cNvPr id="27" name="Bild 32">
+            <a:extLst>
+              <a:ext uri="{FF2B5EF4-FFF2-40B4-BE49-F238E27FC236}">
+                <a16:creationId xmlns:a16="http://schemas.microsoft.com/office/drawing/2014/main" id="{0A697678-C13B-4B4F-82F7-FB3A436C0CE9}"/>
+              </a:ext>
+            </a:extLst>
+          </p:cNvPr>
+          <p:cNvPicPr>
+            <a:picLocks noChangeAspect="1"/>
+          </p:cNvPicPr>
+          <p:nvPr/>
+        </p:nvPicPr>
+        <p:blipFill rotWithShape="1">
+          <a:blip r:embed="rId6">
+            <a:duotone>
+              <a:schemeClr val="accent2">
+                <a:shade val="45000"/>
+                <a:satMod val="135000"/>
+              </a:schemeClr>
+              <a:prstClr val="white"/>
+            </a:duotone>
+            <a:extLst>
+              <a:ext uri="{28A0092B-C50C-407E-A947-70E740481C1C}">
+                <a14:useLocalDpi xmlns:a14="http://schemas.microsoft.com/office/drawing/2010/main" val="0"/>
+              </a:ext>
+            </a:extLst>
+          </a:blip>
+          <a:srcRect t="-5177"/>
+          <a:stretch/>
+        </p:blipFill>
+        <p:spPr>
+          <a:xfrm>
+            <a:off x="7486627" y="4983314"/>
+            <a:ext cx="418207" cy="439857"/>
+          </a:xfrm>
+          <a:prstGeom prst="rect">
+            <a:avLst/>
+          </a:prstGeom>
+        </p:spPr>
+      </p:pic>
+      <p:sp>
+        <p:nvSpPr>
+          <p:cNvPr id="28" name="Rechteck 96">
+            <a:extLst>
+              <a:ext uri="{FF2B5EF4-FFF2-40B4-BE49-F238E27FC236}">
+                <a16:creationId xmlns:a16="http://schemas.microsoft.com/office/drawing/2014/main" id="{A5192166-F1DE-E948-BC1C-6115EA2685D1}"/>
+              </a:ext>
+            </a:extLst>
+          </p:cNvPr>
+          <p:cNvSpPr/>
+          <p:nvPr/>
+        </p:nvSpPr>
+        <p:spPr>
+          <a:xfrm>
+            <a:off x="5141746" y="1787923"/>
+            <a:ext cx="545021" cy="323165"/>
+          </a:xfrm>
+          <a:prstGeom prst="rect">
+            <a:avLst/>
+          </a:prstGeom>
+        </p:spPr>
+        <p:txBody>
+          <a:bodyPr wrap="none" lIns="0" tIns="0" rIns="0" bIns="0">
+            <a:spAutoFit/>
+          </a:bodyPr>
+          <a:lstStyle/>
+          <a:p>
+            <a:r>
+              <a:rPr lang="en-US" sz="1050" b="1" dirty="0">
+                <a:solidFill>
+                  <a:srgbClr val="427CAC"/>
+                </a:solidFill>
+                <a:latin typeface="+mn-lt"/>
+                <a:ea typeface="Arial" charset="0"/>
+                <a:cs typeface="Arial" charset="0"/>
+              </a:rPr>
+              <a:t>SAP </a:t>
+            </a:r>
+            <a:br>
+              <a:rPr lang="en-US" sz="1050" b="1" dirty="0">
+                <a:solidFill>
+                  <a:srgbClr val="427CAC"/>
+                </a:solidFill>
+                <a:latin typeface="+mn-lt"/>
+                <a:ea typeface="Arial" charset="0"/>
+                <a:cs typeface="Arial" charset="0"/>
+              </a:rPr>
+            </a:br>
+            <a:r>
+              <a:rPr lang="en-US" sz="1050" b="1" dirty="0">
+                <a:solidFill>
+                  <a:srgbClr val="427CAC"/>
+                </a:solidFill>
+                <a:latin typeface="+mn-lt"/>
+                <a:ea typeface="Arial" charset="0"/>
+                <a:cs typeface="Arial" charset="0"/>
+              </a:rPr>
+              <a:t>Web IDE</a:t>
+            </a:r>
+          </a:p>
+        </p:txBody>
+      </p:sp>
+      <p:sp>
+        <p:nvSpPr>
+          <p:cNvPr id="29" name="Rectangle 69">
+            <a:extLst>
+              <a:ext uri="{FF2B5EF4-FFF2-40B4-BE49-F238E27FC236}">
+                <a16:creationId xmlns:a16="http://schemas.microsoft.com/office/drawing/2014/main" id="{4AC8FDAF-0A84-CA42-B6CC-044CD775650D}"/>
+              </a:ext>
+            </a:extLst>
+          </p:cNvPr>
+          <p:cNvSpPr/>
+          <p:nvPr/>
+        </p:nvSpPr>
+        <p:spPr>
+          <a:xfrm>
+            <a:off x="8095745" y="1762077"/>
+            <a:ext cx="1275990" cy="323165"/>
+          </a:xfrm>
+          <a:prstGeom prst="rect">
+            <a:avLst/>
+          </a:prstGeom>
+        </p:spPr>
+        <p:txBody>
+          <a:bodyPr wrap="none" lIns="0" tIns="0" rIns="0" bIns="0">
+            <a:spAutoFit/>
+          </a:bodyPr>
+          <a:lstStyle/>
+          <a:p>
+            <a:r>
+              <a:rPr lang="en-US" sz="1050" b="1" dirty="0">
+                <a:solidFill>
+                  <a:srgbClr val="427CAC"/>
+                </a:solidFill>
+                <a:ea typeface="Arial" charset="0"/>
+                <a:cs typeface="Arial" charset="0"/>
+              </a:rPr>
+              <a:t>Portal</a:t>
+            </a:r>
+            <a:br>
+              <a:rPr lang="en-US" sz="1050" b="1" dirty="0">
+                <a:solidFill>
+                  <a:srgbClr val="427CAC"/>
+                </a:solidFill>
+                <a:ea typeface="Arial" charset="0"/>
+                <a:cs typeface="Arial" charset="0"/>
+              </a:rPr>
+            </a:br>
+            <a:r>
+              <a:rPr lang="en-US" sz="1050" dirty="0">
+                <a:solidFill>
+                  <a:srgbClr val="427CAC"/>
+                </a:solidFill>
+                <a:ea typeface="Arial" charset="0"/>
+                <a:cs typeface="Arial" charset="0"/>
+              </a:rPr>
+              <a:t>SAP Fiori Launchpad</a:t>
+            </a:r>
+          </a:p>
+        </p:txBody>
+      </p:sp>
+      <p:cxnSp>
+        <p:nvCxnSpPr>
+          <p:cNvPr id="30" name="Gewinkelte Verbindung 42">
+            <a:extLst>
+              <a:ext uri="{FF2B5EF4-FFF2-40B4-BE49-F238E27FC236}">
+                <a16:creationId xmlns:a16="http://schemas.microsoft.com/office/drawing/2014/main" id="{380728BE-7189-A141-A0B9-289C1F3881B7}"/>
+              </a:ext>
+            </a:extLst>
+          </p:cNvPr>
+          <p:cNvCxnSpPr>
+            <a:cxnSpLocks/>
+            <a:stCxn id="25" idx="4"/>
+          </p:cNvCxnSpPr>
+          <p:nvPr/>
+        </p:nvCxnSpPr>
+        <p:spPr>
+          <a:xfrm>
+            <a:off x="7695731" y="4384316"/>
+            <a:ext cx="0" cy="552784"/>
+          </a:xfrm>
+          <a:prstGeom prst="straightConnector1">
+            <a:avLst/>
+          </a:prstGeom>
+          <a:ln w="19050" cap="rnd" cmpd="sng">
+            <a:solidFill>
+              <a:schemeClr val="tx1">
+                <a:lumMod val="65000"/>
+                <a:lumOff val="35000"/>
+              </a:schemeClr>
+            </a:solidFill>
+            <a:round/>
+            <a:headEnd type="none" w="med" len="med"/>
+            <a:tailEnd type="triangle" w="med" len="med"/>
+          </a:ln>
+        </p:spPr>
+        <p:style>
+          <a:lnRef idx="1">
+            <a:schemeClr val="accent1"/>
+          </a:lnRef>
+          <a:fillRef idx="0">
+            <a:schemeClr val="accent1"/>
+          </a:fillRef>
+          <a:effectRef idx="0">
+            <a:schemeClr val="accent1"/>
+          </a:effectRef>
+          <a:fontRef idx="minor">
+            <a:schemeClr val="tx1"/>
+          </a:fontRef>
+        </p:style>
+      </p:cxnSp>
+      <p:sp>
+        <p:nvSpPr>
+          <p:cNvPr id="31" name="TextBox 71">
+            <a:extLst>
+              <a:ext uri="{FF2B5EF4-FFF2-40B4-BE49-F238E27FC236}">
+                <a16:creationId xmlns:a16="http://schemas.microsoft.com/office/drawing/2014/main" id="{9FFA0F91-060E-D04B-A473-A80D7892DAF4}"/>
+              </a:ext>
+            </a:extLst>
+          </p:cNvPr>
+          <p:cNvSpPr txBox="1"/>
+          <p:nvPr/>
+        </p:nvSpPr>
+        <p:spPr>
+          <a:xfrm>
+            <a:off x="641154" y="5669402"/>
+            <a:ext cx="1912383" cy="161583"/>
+          </a:xfrm>
+          <a:prstGeom prst="rect">
+            <a:avLst/>
+          </a:prstGeom>
+          <a:noFill/>
+        </p:spPr>
+        <p:txBody>
+          <a:bodyPr wrap="none" lIns="0" tIns="0" rIns="0" bIns="0" rtlCol="0">
+            <a:spAutoFit/>
+          </a:bodyPr>
+          <a:lstStyle/>
+          <a:p>
+            <a:pPr fontAlgn="base">
+              <a:spcBef>
+                <a:spcPct val="50000"/>
+              </a:spcBef>
+              <a:spcAft>
+                <a:spcPct val="0"/>
+              </a:spcAft>
+              <a:buClr>
+                <a:srgbClr val="F0AB00"/>
+              </a:buClr>
+              <a:buSzPct val="80000"/>
+            </a:pPr>
+            <a:r>
+              <a:rPr lang="en-US" sz="1050" kern="0" dirty="0">
+                <a:latin typeface="+mn-lt"/>
+                <a:ea typeface="Arial Unicode MS" pitchFamily="34" charset="-128"/>
+                <a:cs typeface="Arial Unicode MS" pitchFamily="34" charset="-128"/>
+              </a:rPr>
+              <a:t>**Support of SAP Vora planned.</a:t>
+            </a:r>
+          </a:p>
+        </p:txBody>
+      </p:sp>
+      <p:cxnSp>
+        <p:nvCxnSpPr>
+          <p:cNvPr id="32" name="Gewinkelte Verbindung 42">
+            <a:extLst>
+              <a:ext uri="{FF2B5EF4-FFF2-40B4-BE49-F238E27FC236}">
+                <a16:creationId xmlns:a16="http://schemas.microsoft.com/office/drawing/2014/main" id="{0767F368-C9F6-424B-BA13-8AE10D56AA89}"/>
+              </a:ext>
+            </a:extLst>
+          </p:cNvPr>
+          <p:cNvCxnSpPr>
+            <a:stCxn id="48" idx="2"/>
+            <a:endCxn id="49" idx="0"/>
+          </p:cNvCxnSpPr>
+          <p:nvPr/>
+        </p:nvCxnSpPr>
+        <p:spPr>
+          <a:xfrm>
+            <a:off x="2871958" y="3411055"/>
+            <a:ext cx="0" cy="542611"/>
+          </a:xfrm>
+          <a:prstGeom prst="straightConnector1">
+            <a:avLst/>
+          </a:prstGeom>
+          <a:ln w="19050" cap="rnd" cmpd="sng">
+            <a:solidFill>
+              <a:schemeClr val="tx1">
+                <a:lumMod val="65000"/>
+                <a:lumOff val="35000"/>
+              </a:schemeClr>
+            </a:solidFill>
+            <a:round/>
+            <a:headEnd type="none" w="med" len="med"/>
+            <a:tailEnd type="triangle" w="med" len="med"/>
+          </a:ln>
+        </p:spPr>
+        <p:style>
+          <a:lnRef idx="1">
+            <a:schemeClr val="accent1"/>
+          </a:lnRef>
+          <a:fillRef idx="0">
+            <a:schemeClr val="accent1"/>
+          </a:fillRef>
+          <a:effectRef idx="0">
+            <a:schemeClr val="accent1"/>
+          </a:effectRef>
+          <a:fontRef idx="minor">
+            <a:schemeClr val="tx1"/>
+          </a:fontRef>
+        </p:style>
+      </p:cxnSp>
+      <p:sp>
+        <p:nvSpPr>
+          <p:cNvPr id="33" name="Shape 2158">
+            <a:extLst>
+              <a:ext uri="{FF2B5EF4-FFF2-40B4-BE49-F238E27FC236}">
+                <a16:creationId xmlns:a16="http://schemas.microsoft.com/office/drawing/2014/main" id="{75F9F231-F16F-F347-8BF2-633436F84B61}"/>
+              </a:ext>
+            </a:extLst>
+          </p:cNvPr>
+          <p:cNvSpPr/>
+          <p:nvPr/>
+        </p:nvSpPr>
+        <p:spPr>
+          <a:xfrm>
+            <a:off x="4405362" y="2614072"/>
+            <a:ext cx="4088655" cy="2009665"/>
+          </a:xfrm>
+          <a:prstGeom prst="roundRect">
+            <a:avLst>
+              <a:gd name="adj" fmla="val 399"/>
+            </a:avLst>
+          </a:prstGeom>
+          <a:noFill/>
+          <a:ln w="19050" cap="rnd">
+            <a:solidFill>
+              <a:srgbClr val="0092D1"/>
+            </a:solidFill>
+          </a:ln>
+        </p:spPr>
+        <p:style>
+          <a:lnRef idx="2">
+            <a:schemeClr val="accent1">
+              <a:shade val="50000"/>
+            </a:schemeClr>
+          </a:lnRef>
+          <a:fillRef idx="1">
+            <a:schemeClr val="accent1"/>
+          </a:fillRef>
+          <a:effectRef idx="0">
+            <a:schemeClr val="accent1"/>
+          </a:effectRef>
+          <a:fontRef idx="minor">
+            <a:schemeClr val="lt1"/>
+          </a:fontRef>
+        </p:style>
+        <p:txBody>
+          <a:bodyPr lIns="72000" tIns="72000" rIns="72000" bIns="72000" rtlCol="0" anchor="t"/>
+          <a:lstStyle/>
+          <a:p>
+            <a:r>
+              <a:rPr lang="en-US" sz="1050" b="1" dirty="0">
+                <a:solidFill>
+                  <a:schemeClr val="tx1">
+                    <a:lumMod val="65000"/>
+                    <a:lumOff val="35000"/>
+                  </a:schemeClr>
+                </a:solidFill>
+                <a:sym typeface="Arial"/>
+              </a:rPr>
+              <a:t> </a:t>
+            </a:r>
+            <a:r>
+              <a:rPr lang="en-US" sz="1100" b="1" dirty="0">
+                <a:solidFill>
+                  <a:srgbClr val="427CAC"/>
+                </a:solidFill>
+                <a:cs typeface="Arial" charset="0"/>
+                <a:sym typeface="Arial"/>
+              </a:rPr>
+              <a:t>Cloud Foundry Environment</a:t>
+            </a:r>
+          </a:p>
+        </p:txBody>
+      </p:sp>
+      <p:cxnSp>
+        <p:nvCxnSpPr>
+          <p:cNvPr id="34" name="Straight Connector 74">
+            <a:extLst>
+              <a:ext uri="{FF2B5EF4-FFF2-40B4-BE49-F238E27FC236}">
+                <a16:creationId xmlns:a16="http://schemas.microsoft.com/office/drawing/2014/main" id="{FD8D5177-5AB6-6843-9766-5F52534B5B3D}"/>
+              </a:ext>
+            </a:extLst>
+          </p:cNvPr>
+          <p:cNvCxnSpPr>
+            <a:cxnSpLocks/>
+            <a:stCxn id="23" idx="6"/>
+            <a:endCxn id="25" idx="2"/>
+          </p:cNvCxnSpPr>
+          <p:nvPr/>
+        </p:nvCxnSpPr>
+        <p:spPr>
+          <a:xfrm>
+            <a:off x="5616934" y="4018364"/>
+            <a:ext cx="1718797" cy="5952"/>
+          </a:xfrm>
+          <a:prstGeom prst="line">
+            <a:avLst/>
+          </a:prstGeom>
+          <a:ln w="19050" cap="rnd" cmpd="sng">
+            <a:solidFill>
+              <a:schemeClr val="tx1">
+                <a:lumMod val="65000"/>
+                <a:lumOff val="35000"/>
+              </a:schemeClr>
+            </a:solidFill>
+            <a:round/>
+            <a:headEnd type="none" w="med" len="med"/>
+            <a:tailEnd type="triangle" w="med" len="med"/>
+          </a:ln>
+        </p:spPr>
+        <p:style>
+          <a:lnRef idx="1">
+            <a:schemeClr val="accent1"/>
+          </a:lnRef>
+          <a:fillRef idx="0">
+            <a:schemeClr val="accent1"/>
+          </a:fillRef>
+          <a:effectRef idx="0">
+            <a:schemeClr val="accent1"/>
+          </a:effectRef>
+          <a:fontRef idx="minor">
+            <a:schemeClr val="tx1"/>
+          </a:fontRef>
+        </p:style>
+      </p:cxnSp>
+      <p:sp>
+        <p:nvSpPr>
+          <p:cNvPr id="35" name="Rectangle 75">
+            <a:extLst>
+              <a:ext uri="{FF2B5EF4-FFF2-40B4-BE49-F238E27FC236}">
+                <a16:creationId xmlns:a16="http://schemas.microsoft.com/office/drawing/2014/main" id="{D45C031A-369A-E746-A60B-B213E618B61B}"/>
+              </a:ext>
+            </a:extLst>
+          </p:cNvPr>
+          <p:cNvSpPr/>
+          <p:nvPr/>
+        </p:nvSpPr>
+        <p:spPr bwMode="gray">
+          <a:xfrm>
+            <a:off x="5889008" y="3745239"/>
+            <a:ext cx="1120766" cy="543790"/>
+          </a:xfrm>
+          <a:prstGeom prst="rect">
+            <a:avLst/>
+          </a:prstGeom>
+          <a:solidFill>
+            <a:schemeClr val="bg1"/>
+          </a:solidFill>
+          <a:ln>
+            <a:solidFill>
+              <a:srgbClr val="1A9898"/>
+            </a:solidFill>
+          </a:ln>
+        </p:spPr>
+        <p:style>
+          <a:lnRef idx="2">
+            <a:schemeClr val="accent1">
+              <a:shade val="50000"/>
+            </a:schemeClr>
+          </a:lnRef>
+          <a:fillRef idx="1">
+            <a:schemeClr val="accent1"/>
+          </a:fillRef>
+          <a:effectRef idx="0">
+            <a:schemeClr val="accent1"/>
+          </a:effectRef>
+          <a:fontRef idx="minor">
+            <a:schemeClr val="lt1"/>
+          </a:fontRef>
+        </p:style>
+        <p:txBody>
+          <a:bodyPr lIns="72000" tIns="72000" rIns="72000" bIns="72000" rtlCol="0" anchor="ctr"/>
+          <a:lstStyle/>
+          <a:p>
+            <a:pPr algn="ctr"/>
+            <a:r>
+              <a:rPr lang="en-US" sz="1100" b="1" dirty="0">
+                <a:solidFill>
+                  <a:schemeClr val="tx1">
+                    <a:lumMod val="65000"/>
+                    <a:lumOff val="35000"/>
+                  </a:schemeClr>
+                </a:solidFill>
+                <a:ea typeface="Arial" charset="0"/>
+                <a:cs typeface="Arial" charset="0"/>
+              </a:rPr>
+              <a:t>Data Ingestion Pipeline</a:t>
+            </a:r>
+          </a:p>
+        </p:txBody>
+      </p:sp>
+      <p:sp>
+        <p:nvSpPr>
+          <p:cNvPr id="36" name="TextBox 76">
+            <a:extLst>
+              <a:ext uri="{FF2B5EF4-FFF2-40B4-BE49-F238E27FC236}">
+                <a16:creationId xmlns:a16="http://schemas.microsoft.com/office/drawing/2014/main" id="{3AD8A977-5220-A240-854E-4F365060B87A}"/>
+              </a:ext>
+            </a:extLst>
+          </p:cNvPr>
+          <p:cNvSpPr txBox="1"/>
+          <p:nvPr/>
+        </p:nvSpPr>
+        <p:spPr>
+          <a:xfrm>
+            <a:off x="2423068" y="3591350"/>
+            <a:ext cx="360676" cy="153888"/>
+          </a:xfrm>
+          <a:prstGeom prst="rect">
+            <a:avLst/>
+          </a:prstGeom>
+          <a:noFill/>
+        </p:spPr>
+        <p:txBody>
+          <a:bodyPr wrap="none" lIns="0" tIns="0" rIns="0" bIns="0" rtlCol="0">
+            <a:spAutoFit/>
+          </a:bodyPr>
+          <a:lstStyle/>
+          <a:p>
+            <a:pPr fontAlgn="base">
+              <a:spcBef>
+                <a:spcPct val="50000"/>
+              </a:spcBef>
+              <a:spcAft>
+                <a:spcPct val="0"/>
+              </a:spcAft>
+              <a:buClr>
+                <a:srgbClr val="F0AB00"/>
+              </a:buClr>
+              <a:buSzPct val="80000"/>
+            </a:pPr>
+            <a:r>
+              <a:rPr lang="en-US" sz="1000" i="1" kern="0" dirty="0">
+                <a:solidFill>
+                  <a:schemeClr val="tx1">
+                    <a:lumMod val="65000"/>
+                    <a:lumOff val="35000"/>
+                  </a:schemeClr>
+                </a:solidFill>
+                <a:latin typeface="+mn-lt"/>
+                <a:ea typeface="Arial Unicode MS" pitchFamily="34" charset="-128"/>
+                <a:cs typeface="Arial Unicode MS" pitchFamily="34" charset="-128"/>
+              </a:rPr>
+              <a:t>run on</a:t>
+            </a:r>
+          </a:p>
+        </p:txBody>
+      </p:sp>
+      <p:sp>
+        <p:nvSpPr>
+          <p:cNvPr id="37" name="Rechteck 61">
+            <a:extLst>
+              <a:ext uri="{FF2B5EF4-FFF2-40B4-BE49-F238E27FC236}">
+                <a16:creationId xmlns:a16="http://schemas.microsoft.com/office/drawing/2014/main" id="{F4877084-417F-094E-B8FE-4F73B55D9DAB}"/>
+              </a:ext>
+            </a:extLst>
+          </p:cNvPr>
+          <p:cNvSpPr/>
+          <p:nvPr/>
+        </p:nvSpPr>
+        <p:spPr>
+          <a:xfrm>
+            <a:off x="1695180" y="1798009"/>
+            <a:ext cx="2253405" cy="3057549"/>
+          </a:xfrm>
+          <a:prstGeom prst="rect">
+            <a:avLst/>
+          </a:prstGeom>
+          <a:noFill/>
+          <a:ln w="19050">
+            <a:solidFill>
+              <a:schemeClr val="tx1">
+                <a:lumMod val="65000"/>
+                <a:lumOff val="35000"/>
+              </a:schemeClr>
+            </a:solidFill>
+          </a:ln>
+          <a:effectLst/>
+        </p:spPr>
+        <p:style>
+          <a:lnRef idx="2">
+            <a:schemeClr val="accent1">
+              <a:shade val="50000"/>
+            </a:schemeClr>
+          </a:lnRef>
+          <a:fillRef idx="1">
+            <a:schemeClr val="accent1"/>
+          </a:fillRef>
+          <a:effectRef idx="0">
+            <a:schemeClr val="accent1"/>
+          </a:effectRef>
+          <a:fontRef idx="minor">
+            <a:schemeClr val="lt1"/>
+          </a:fontRef>
+        </p:style>
+        <p:txBody>
+          <a:bodyPr lIns="72000" tIns="72000" rIns="72000" bIns="0" rtlCol="0" anchor="t" anchorCtr="0"/>
+          <a:lstStyle/>
+          <a:p>
+            <a:pPr algn="ctr"/>
+            <a:r>
+              <a:rPr lang="en-US" sz="1400" b="1" kern="0" dirty="0">
+                <a:solidFill>
+                  <a:schemeClr val="tx1">
+                    <a:lumMod val="65000"/>
+                    <a:lumOff val="35000"/>
+                  </a:schemeClr>
+                </a:solidFill>
+                <a:ea typeface="BentonSans" charset="0"/>
+                <a:cs typeface="BentonSans" charset="0"/>
+              </a:rPr>
+              <a:t>Hardware Gateway</a:t>
+            </a:r>
+          </a:p>
+        </p:txBody>
+      </p:sp>
+      <p:sp>
+        <p:nvSpPr>
+          <p:cNvPr id="38" name="Textfeld 6">
+            <a:extLst>
+              <a:ext uri="{FF2B5EF4-FFF2-40B4-BE49-F238E27FC236}">
+                <a16:creationId xmlns:a16="http://schemas.microsoft.com/office/drawing/2014/main" id="{2523FE83-A41F-8D47-A97A-3DFD5E006CBD}"/>
+              </a:ext>
+            </a:extLst>
+          </p:cNvPr>
+          <p:cNvSpPr txBox="1"/>
+          <p:nvPr/>
+        </p:nvSpPr>
+        <p:spPr>
+          <a:xfrm>
+            <a:off x="1919536" y="1196752"/>
+            <a:ext cx="3521030" cy="307777"/>
+          </a:xfrm>
+          <a:prstGeom prst="rect">
+            <a:avLst/>
+          </a:prstGeom>
+          <a:noFill/>
+        </p:spPr>
+        <p:txBody>
+          <a:bodyPr wrap="square" rtlCol="0">
+            <a:spAutoFit/>
+          </a:bodyPr>
+          <a:lstStyle/>
+          <a:p>
+            <a:pPr algn="ctr"/>
+            <a:r>
+              <a:rPr lang="en-US" sz="1400" b="1" dirty="0">
+                <a:solidFill>
+                  <a:schemeClr val="tx1">
+                    <a:lumMod val="65000"/>
+                    <a:lumOff val="35000"/>
+                  </a:schemeClr>
+                </a:solidFill>
+                <a:latin typeface="+mn-lt"/>
+                <a:ea typeface="BentonSans Medium" charset="0"/>
+                <a:cs typeface="BentonSans Medium" charset="0"/>
+              </a:rPr>
+              <a:t>INTERNET</a:t>
+            </a:r>
+          </a:p>
+        </p:txBody>
+      </p:sp>
+      <p:cxnSp>
+        <p:nvCxnSpPr>
+          <p:cNvPr id="39" name="Straight Arrow Connector 79">
+            <a:extLst>
+              <a:ext uri="{FF2B5EF4-FFF2-40B4-BE49-F238E27FC236}">
+                <a16:creationId xmlns:a16="http://schemas.microsoft.com/office/drawing/2014/main" id="{85CA7CD5-57C9-794C-A322-36B2E90CDA02}"/>
+              </a:ext>
+            </a:extLst>
+          </p:cNvPr>
+          <p:cNvCxnSpPr>
+            <a:cxnSpLocks/>
+            <a:stCxn id="9" idx="3"/>
+            <a:endCxn id="33" idx="1"/>
+          </p:cNvCxnSpPr>
+          <p:nvPr/>
+        </p:nvCxnSpPr>
+        <p:spPr>
+          <a:xfrm flipV="1">
+            <a:off x="3790337" y="3618905"/>
+            <a:ext cx="615025" cy="171"/>
+          </a:xfrm>
+          <a:prstGeom prst="straightConnector1">
+            <a:avLst/>
+          </a:prstGeom>
+          <a:ln w="19050" cap="rnd" cmpd="sng">
+            <a:solidFill>
+              <a:schemeClr val="tx1">
+                <a:lumMod val="65000"/>
+                <a:lumOff val="35000"/>
+              </a:schemeClr>
+            </a:solidFill>
+            <a:round/>
+            <a:headEnd type="triangle" w="med" len="med"/>
+            <a:tailEnd type="triangle" w="med" len="med"/>
+          </a:ln>
+        </p:spPr>
+        <p:style>
+          <a:lnRef idx="1">
+            <a:schemeClr val="accent1"/>
+          </a:lnRef>
+          <a:fillRef idx="0">
+            <a:schemeClr val="accent1"/>
+          </a:fillRef>
+          <a:effectRef idx="0">
+            <a:schemeClr val="accent1"/>
+          </a:effectRef>
+          <a:fontRef idx="minor">
+            <a:schemeClr val="tx1"/>
+          </a:fontRef>
+        </p:style>
+      </p:cxnSp>
+      <p:pic>
+        <p:nvPicPr>
+          <p:cNvPr id="40" name="Bild 35">
+            <a:extLst>
+              <a:ext uri="{FF2B5EF4-FFF2-40B4-BE49-F238E27FC236}">
+                <a16:creationId xmlns:a16="http://schemas.microsoft.com/office/drawing/2014/main" id="{FB0D201C-AC00-8144-9220-CFD8E72EC657}"/>
+              </a:ext>
+            </a:extLst>
+          </p:cNvPr>
+          <p:cNvPicPr>
+            <a:picLocks noChangeAspect="1"/>
+          </p:cNvPicPr>
+          <p:nvPr/>
+        </p:nvPicPr>
+        <p:blipFill>
+          <a:blip r:embed="rId7">
+            <a:extLst>
+              <a:ext uri="{28A0092B-C50C-407E-A947-70E740481C1C}">
+                <a14:useLocalDpi xmlns:a14="http://schemas.microsoft.com/office/drawing/2010/main" val="0"/>
+              </a:ext>
+            </a:extLst>
+          </a:blip>
+          <a:stretch>
+            <a:fillRect/>
+          </a:stretch>
+        </p:blipFill>
+        <p:spPr>
+          <a:xfrm>
+            <a:off x="7375745" y="1554091"/>
+            <a:ext cx="720000" cy="720000"/>
+          </a:xfrm>
+          <a:prstGeom prst="ellipse">
+            <a:avLst/>
+          </a:prstGeom>
+        </p:spPr>
+      </p:pic>
+      <p:sp>
+        <p:nvSpPr>
+          <p:cNvPr id="41" name="Oval 40">
+            <a:extLst>
+              <a:ext uri="{FF2B5EF4-FFF2-40B4-BE49-F238E27FC236}">
+                <a16:creationId xmlns:a16="http://schemas.microsoft.com/office/drawing/2014/main" id="{079A3FDF-81D5-9848-8324-CE64D5562AA1}"/>
+              </a:ext>
+            </a:extLst>
+          </p:cNvPr>
+          <p:cNvSpPr/>
+          <p:nvPr/>
+        </p:nvSpPr>
+        <p:spPr bwMode="gray">
+          <a:xfrm>
+            <a:off x="1007197" y="3008049"/>
+            <a:ext cx="179958" cy="179958"/>
+          </a:xfrm>
+          <a:prstGeom prst="ellipse">
+            <a:avLst/>
+          </a:prstGeom>
+          <a:noFill/>
+          <a:ln w="12700" algn="ctr">
+            <a:solidFill>
+              <a:schemeClr val="tx1">
+                <a:lumMod val="65000"/>
+                <a:lumOff val="35000"/>
+              </a:schemeClr>
+            </a:solidFill>
+            <a:prstDash val="solid"/>
+            <a:miter lim="800000"/>
+            <a:headEnd/>
+            <a:tailEnd/>
+          </a:ln>
+        </p:spPr>
+        <p:txBody>
+          <a:bodyPr lIns="89979" tIns="71983" rIns="89979" bIns="71983" rtlCol="0" anchor="ctr"/>
+          <a:lstStyle/>
+          <a:p>
+            <a:pPr algn="ctr" defTabSz="914217" fontAlgn="base">
+              <a:spcBef>
+                <a:spcPct val="50000"/>
+              </a:spcBef>
+              <a:spcAft>
+                <a:spcPct val="0"/>
+              </a:spcAft>
+              <a:buClr>
+                <a:srgbClr val="F0AB00"/>
+              </a:buClr>
+              <a:buSzPct val="80000"/>
+            </a:pPr>
+            <a:endParaRPr lang="en-US" sz="1800" kern="0" dirty="0">
+              <a:solidFill>
+                <a:schemeClr val="tx1">
+                  <a:lumMod val="65000"/>
+                  <a:lumOff val="35000"/>
+                </a:schemeClr>
+              </a:solidFill>
+              <a:latin typeface="Arial" panose="020B0604020202020204" pitchFamily="34" charset="0"/>
+              <a:ea typeface="Arial Unicode MS" pitchFamily="34" charset="-128"/>
+              <a:cs typeface="Arial Unicode MS" pitchFamily="34" charset="-128"/>
+            </a:endParaRPr>
+          </a:p>
+        </p:txBody>
+      </p:sp>
+      <p:sp>
+        <p:nvSpPr>
+          <p:cNvPr id="42" name="Oval 41">
+            <a:extLst>
+              <a:ext uri="{FF2B5EF4-FFF2-40B4-BE49-F238E27FC236}">
+                <a16:creationId xmlns:a16="http://schemas.microsoft.com/office/drawing/2014/main" id="{75D2E4DD-C7E6-0743-AD84-6FEBBD95B558}"/>
+              </a:ext>
+            </a:extLst>
+          </p:cNvPr>
+          <p:cNvSpPr/>
+          <p:nvPr/>
+        </p:nvSpPr>
+        <p:spPr bwMode="gray">
+          <a:xfrm>
+            <a:off x="1139905" y="2773977"/>
+            <a:ext cx="179958" cy="179958"/>
+          </a:xfrm>
+          <a:prstGeom prst="ellipse">
+            <a:avLst/>
+          </a:prstGeom>
+          <a:noFill/>
+          <a:ln w="12700" algn="ctr">
+            <a:solidFill>
+              <a:schemeClr val="tx1">
+                <a:lumMod val="65000"/>
+                <a:lumOff val="35000"/>
+              </a:schemeClr>
+            </a:solidFill>
+            <a:prstDash val="solid"/>
+            <a:miter lim="800000"/>
+            <a:headEnd/>
+            <a:tailEnd/>
+          </a:ln>
+        </p:spPr>
+        <p:txBody>
+          <a:bodyPr lIns="89979" tIns="71983" rIns="89979" bIns="71983" rtlCol="0" anchor="ctr"/>
+          <a:lstStyle/>
+          <a:p>
+            <a:pPr algn="ctr" defTabSz="914217" fontAlgn="base">
+              <a:spcBef>
+                <a:spcPct val="50000"/>
+              </a:spcBef>
+              <a:spcAft>
+                <a:spcPct val="0"/>
+              </a:spcAft>
+              <a:buClr>
+                <a:srgbClr val="F0AB00"/>
+              </a:buClr>
+              <a:buSzPct val="80000"/>
+            </a:pPr>
+            <a:endParaRPr lang="en-US" sz="1800" kern="0" dirty="0">
+              <a:solidFill>
+                <a:schemeClr val="tx1">
+                  <a:lumMod val="65000"/>
+                  <a:lumOff val="35000"/>
+                </a:schemeClr>
+              </a:solidFill>
+              <a:latin typeface="Arial" panose="020B0604020202020204" pitchFamily="34" charset="0"/>
+              <a:ea typeface="Arial Unicode MS" pitchFamily="34" charset="-128"/>
+              <a:cs typeface="Arial Unicode MS" pitchFamily="34" charset="-128"/>
+            </a:endParaRPr>
+          </a:p>
+        </p:txBody>
+      </p:sp>
+      <p:sp>
+        <p:nvSpPr>
+          <p:cNvPr id="43" name="Oval 42">
+            <a:extLst>
+              <a:ext uri="{FF2B5EF4-FFF2-40B4-BE49-F238E27FC236}">
+                <a16:creationId xmlns:a16="http://schemas.microsoft.com/office/drawing/2014/main" id="{0EEC46A0-253D-CA47-B900-DCA8A1DDBCC0}"/>
+              </a:ext>
+            </a:extLst>
+          </p:cNvPr>
+          <p:cNvSpPr/>
+          <p:nvPr/>
+        </p:nvSpPr>
+        <p:spPr bwMode="gray">
+          <a:xfrm>
+            <a:off x="1007197" y="3517429"/>
+            <a:ext cx="179958" cy="179958"/>
+          </a:xfrm>
+          <a:prstGeom prst="ellipse">
+            <a:avLst/>
+          </a:prstGeom>
+          <a:noFill/>
+          <a:ln w="12700" algn="ctr">
+            <a:solidFill>
+              <a:schemeClr val="tx1">
+                <a:lumMod val="65000"/>
+                <a:lumOff val="35000"/>
+              </a:schemeClr>
+            </a:solidFill>
+            <a:prstDash val="solid"/>
+            <a:miter lim="800000"/>
+            <a:headEnd/>
+            <a:tailEnd/>
+          </a:ln>
+        </p:spPr>
+        <p:txBody>
+          <a:bodyPr lIns="89979" tIns="71983" rIns="89979" bIns="71983" rtlCol="0" anchor="ctr"/>
+          <a:lstStyle/>
+          <a:p>
+            <a:pPr algn="ctr" defTabSz="914217" fontAlgn="base">
+              <a:spcBef>
+                <a:spcPct val="50000"/>
+              </a:spcBef>
+              <a:spcAft>
+                <a:spcPct val="0"/>
+              </a:spcAft>
+              <a:buClr>
+                <a:srgbClr val="F0AB00"/>
+              </a:buClr>
+              <a:buSzPct val="80000"/>
+            </a:pPr>
+            <a:endParaRPr lang="en-US" sz="1800" kern="0" dirty="0">
+              <a:solidFill>
+                <a:schemeClr val="tx1">
+                  <a:lumMod val="65000"/>
+                  <a:lumOff val="35000"/>
+                </a:schemeClr>
+              </a:solidFill>
+              <a:latin typeface="Arial" panose="020B0604020202020204" pitchFamily="34" charset="0"/>
+              <a:ea typeface="Arial Unicode MS" pitchFamily="34" charset="-128"/>
+              <a:cs typeface="Arial Unicode MS" pitchFamily="34" charset="-128"/>
+            </a:endParaRPr>
+          </a:p>
+        </p:txBody>
+      </p:sp>
+      <p:sp>
+        <p:nvSpPr>
+          <p:cNvPr id="44" name="Oval 43">
+            <a:extLst>
+              <a:ext uri="{FF2B5EF4-FFF2-40B4-BE49-F238E27FC236}">
+                <a16:creationId xmlns:a16="http://schemas.microsoft.com/office/drawing/2014/main" id="{DE5ED7B9-5208-4A4B-A7F0-A4D90BAC9C82}"/>
+              </a:ext>
+            </a:extLst>
+          </p:cNvPr>
+          <p:cNvSpPr/>
+          <p:nvPr/>
+        </p:nvSpPr>
+        <p:spPr bwMode="gray">
+          <a:xfrm>
+            <a:off x="1312336" y="3975630"/>
+            <a:ext cx="179958" cy="179958"/>
+          </a:xfrm>
+          <a:prstGeom prst="ellipse">
+            <a:avLst/>
+          </a:prstGeom>
+          <a:noFill/>
+          <a:ln w="12700" algn="ctr">
+            <a:solidFill>
+              <a:schemeClr val="tx1">
+                <a:lumMod val="65000"/>
+                <a:lumOff val="35000"/>
+              </a:schemeClr>
+            </a:solidFill>
+            <a:prstDash val="solid"/>
+            <a:miter lim="800000"/>
+            <a:headEnd/>
+            <a:tailEnd/>
+          </a:ln>
+        </p:spPr>
+        <p:txBody>
+          <a:bodyPr lIns="89979" tIns="71983" rIns="89979" bIns="71983" rtlCol="0" anchor="ctr"/>
+          <a:lstStyle/>
+          <a:p>
+            <a:pPr algn="ctr" defTabSz="914217" fontAlgn="base">
+              <a:spcBef>
+                <a:spcPct val="50000"/>
+              </a:spcBef>
+              <a:spcAft>
+                <a:spcPct val="0"/>
+              </a:spcAft>
+              <a:buClr>
+                <a:srgbClr val="F0AB00"/>
+              </a:buClr>
+              <a:buSzPct val="80000"/>
+            </a:pPr>
+            <a:endParaRPr lang="en-US" sz="1800" kern="0" dirty="0">
+              <a:solidFill>
+                <a:schemeClr val="tx1">
+                  <a:lumMod val="65000"/>
+                  <a:lumOff val="35000"/>
+                </a:schemeClr>
+              </a:solidFill>
+              <a:latin typeface="Arial" panose="020B0604020202020204" pitchFamily="34" charset="0"/>
+              <a:ea typeface="Arial Unicode MS" pitchFamily="34" charset="-128"/>
+              <a:cs typeface="Arial Unicode MS" pitchFamily="34" charset="-128"/>
+            </a:endParaRPr>
+          </a:p>
+        </p:txBody>
+      </p:sp>
+      <p:sp>
+        <p:nvSpPr>
+          <p:cNvPr id="45" name="Oval 44">
+            <a:extLst>
+              <a:ext uri="{FF2B5EF4-FFF2-40B4-BE49-F238E27FC236}">
+                <a16:creationId xmlns:a16="http://schemas.microsoft.com/office/drawing/2014/main" id="{05E6A1B4-69DB-C941-9C90-4A62F461EE2C}"/>
+              </a:ext>
+            </a:extLst>
+          </p:cNvPr>
+          <p:cNvSpPr/>
+          <p:nvPr/>
+        </p:nvSpPr>
+        <p:spPr bwMode="gray">
+          <a:xfrm>
+            <a:off x="950807" y="3270166"/>
+            <a:ext cx="179958" cy="179958"/>
+          </a:xfrm>
+          <a:prstGeom prst="ellipse">
+            <a:avLst/>
+          </a:prstGeom>
+          <a:noFill/>
+          <a:ln w="12700" algn="ctr">
+            <a:solidFill>
+              <a:schemeClr val="tx1">
+                <a:lumMod val="65000"/>
+                <a:lumOff val="35000"/>
+              </a:schemeClr>
+            </a:solidFill>
+            <a:prstDash val="solid"/>
+            <a:miter lim="800000"/>
+            <a:headEnd/>
+            <a:tailEnd/>
+          </a:ln>
+        </p:spPr>
+        <p:txBody>
+          <a:bodyPr lIns="89979" tIns="71983" rIns="89979" bIns="71983" rtlCol="0" anchor="ctr"/>
+          <a:lstStyle/>
+          <a:p>
+            <a:pPr algn="ctr" defTabSz="914217" fontAlgn="base">
+              <a:spcBef>
+                <a:spcPct val="50000"/>
+              </a:spcBef>
+              <a:spcAft>
+                <a:spcPct val="0"/>
+              </a:spcAft>
+              <a:buClr>
+                <a:srgbClr val="F0AB00"/>
+              </a:buClr>
+              <a:buSzPct val="80000"/>
+            </a:pPr>
+            <a:endParaRPr lang="en-US" sz="1800" kern="0" dirty="0">
+              <a:solidFill>
+                <a:schemeClr val="tx1">
+                  <a:lumMod val="65000"/>
+                  <a:lumOff val="35000"/>
+                </a:schemeClr>
+              </a:solidFill>
+              <a:latin typeface="Arial" panose="020B0604020202020204" pitchFamily="34" charset="0"/>
+              <a:ea typeface="Arial Unicode MS" pitchFamily="34" charset="-128"/>
+              <a:cs typeface="Arial Unicode MS" pitchFamily="34" charset="-128"/>
+            </a:endParaRPr>
+          </a:p>
+        </p:txBody>
+      </p:sp>
+      <p:sp>
+        <p:nvSpPr>
+          <p:cNvPr id="46" name="Oval 45">
+            <a:extLst>
+              <a:ext uri="{FF2B5EF4-FFF2-40B4-BE49-F238E27FC236}">
+                <a16:creationId xmlns:a16="http://schemas.microsoft.com/office/drawing/2014/main" id="{7D33C541-F24C-D642-AB1D-BB242F253E98}"/>
+              </a:ext>
+            </a:extLst>
+          </p:cNvPr>
+          <p:cNvSpPr/>
+          <p:nvPr/>
+        </p:nvSpPr>
+        <p:spPr bwMode="gray">
+          <a:xfrm>
+            <a:off x="1325029" y="2614088"/>
+            <a:ext cx="179958" cy="179958"/>
+          </a:xfrm>
+          <a:prstGeom prst="ellipse">
+            <a:avLst/>
+          </a:prstGeom>
+          <a:noFill/>
+          <a:ln w="12700" algn="ctr">
+            <a:solidFill>
+              <a:schemeClr val="tx1">
+                <a:lumMod val="65000"/>
+                <a:lumOff val="35000"/>
+              </a:schemeClr>
+            </a:solidFill>
+            <a:prstDash val="solid"/>
+            <a:miter lim="800000"/>
+            <a:headEnd/>
+            <a:tailEnd/>
+          </a:ln>
+        </p:spPr>
+        <p:txBody>
+          <a:bodyPr lIns="89979" tIns="71983" rIns="89979" bIns="71983" rtlCol="0" anchor="ctr"/>
+          <a:lstStyle/>
+          <a:p>
+            <a:pPr algn="ctr" defTabSz="914217" fontAlgn="base">
+              <a:spcBef>
+                <a:spcPct val="50000"/>
+              </a:spcBef>
+              <a:spcAft>
+                <a:spcPct val="0"/>
+              </a:spcAft>
+              <a:buClr>
+                <a:srgbClr val="F0AB00"/>
+              </a:buClr>
+              <a:buSzPct val="80000"/>
+            </a:pPr>
+            <a:endParaRPr lang="en-US" sz="1800" kern="0" dirty="0">
+              <a:solidFill>
+                <a:schemeClr val="tx1">
+                  <a:lumMod val="65000"/>
+                  <a:lumOff val="35000"/>
+                </a:schemeClr>
+              </a:solidFill>
+              <a:latin typeface="Arial" panose="020B0604020202020204" pitchFamily="34" charset="0"/>
+              <a:ea typeface="Arial Unicode MS" pitchFamily="34" charset="-128"/>
+              <a:cs typeface="Arial Unicode MS" pitchFamily="34" charset="-128"/>
+            </a:endParaRPr>
+          </a:p>
+        </p:txBody>
+      </p:sp>
+      <p:sp>
+        <p:nvSpPr>
+          <p:cNvPr id="47" name="Oval 46">
+            <a:extLst>
+              <a:ext uri="{FF2B5EF4-FFF2-40B4-BE49-F238E27FC236}">
+                <a16:creationId xmlns:a16="http://schemas.microsoft.com/office/drawing/2014/main" id="{1FD4FABC-1C15-3541-AE3D-D3490D0AF6B4}"/>
+              </a:ext>
+            </a:extLst>
+          </p:cNvPr>
+          <p:cNvSpPr/>
+          <p:nvPr/>
+        </p:nvSpPr>
+        <p:spPr bwMode="gray">
+          <a:xfrm>
+            <a:off x="1136987" y="3762608"/>
+            <a:ext cx="179958" cy="179958"/>
+          </a:xfrm>
+          <a:prstGeom prst="ellipse">
+            <a:avLst/>
+          </a:prstGeom>
+          <a:noFill/>
+          <a:ln w="12700" algn="ctr">
+            <a:solidFill>
+              <a:schemeClr val="tx1">
+                <a:lumMod val="65000"/>
+                <a:lumOff val="35000"/>
+              </a:schemeClr>
+            </a:solidFill>
+            <a:prstDash val="solid"/>
+            <a:miter lim="800000"/>
+            <a:headEnd/>
+            <a:tailEnd/>
+          </a:ln>
+        </p:spPr>
+        <p:txBody>
+          <a:bodyPr lIns="89979" tIns="71983" rIns="89979" bIns="71983" rtlCol="0" anchor="ctr"/>
+          <a:lstStyle/>
+          <a:p>
+            <a:pPr algn="ctr" defTabSz="914217" fontAlgn="base">
+              <a:spcBef>
+                <a:spcPct val="50000"/>
+              </a:spcBef>
+              <a:spcAft>
+                <a:spcPct val="0"/>
+              </a:spcAft>
+              <a:buClr>
+                <a:srgbClr val="F0AB00"/>
+              </a:buClr>
+              <a:buSzPct val="80000"/>
+            </a:pPr>
+            <a:endParaRPr lang="en-US" sz="1800" kern="0" dirty="0">
+              <a:solidFill>
+                <a:schemeClr val="tx1">
+                  <a:lumMod val="65000"/>
+                  <a:lumOff val="35000"/>
+                </a:schemeClr>
+              </a:solidFill>
+              <a:latin typeface="Arial" panose="020B0604020202020204" pitchFamily="34" charset="0"/>
+              <a:ea typeface="Arial Unicode MS" pitchFamily="34" charset="-128"/>
+              <a:cs typeface="Arial Unicode MS" pitchFamily="34" charset="-128"/>
+            </a:endParaRPr>
+          </a:p>
+        </p:txBody>
+      </p:sp>
+      <p:sp>
+        <p:nvSpPr>
+          <p:cNvPr id="48" name="Rechteck 9">
+            <a:extLst>
+              <a:ext uri="{FF2B5EF4-FFF2-40B4-BE49-F238E27FC236}">
+                <a16:creationId xmlns:a16="http://schemas.microsoft.com/office/drawing/2014/main" id="{9E1D1423-CE2A-6F40-98E4-2863AF01F048}"/>
+              </a:ext>
+            </a:extLst>
+          </p:cNvPr>
+          <p:cNvSpPr/>
+          <p:nvPr/>
+        </p:nvSpPr>
+        <p:spPr>
+          <a:xfrm>
+            <a:off x="2102826" y="2953935"/>
+            <a:ext cx="1538264" cy="457120"/>
+          </a:xfrm>
+          <a:prstGeom prst="rect">
+            <a:avLst/>
+          </a:prstGeom>
+          <a:noFill/>
+          <a:ln w="19050" cap="rnd">
+            <a:solidFill>
+              <a:srgbClr val="1A9898"/>
+            </a:solidFill>
+          </a:ln>
+        </p:spPr>
+        <p:style>
+          <a:lnRef idx="2">
+            <a:schemeClr val="accent1">
+              <a:shade val="50000"/>
+            </a:schemeClr>
+          </a:lnRef>
+          <a:fillRef idx="1">
+            <a:schemeClr val="accent1"/>
+          </a:fillRef>
+          <a:effectRef idx="0">
+            <a:schemeClr val="accent1"/>
+          </a:effectRef>
+          <a:fontRef idx="minor">
+            <a:schemeClr val="lt1"/>
+          </a:fontRef>
+        </p:style>
+        <p:txBody>
+          <a:bodyPr lIns="72000" tIns="72000" rIns="72000" bIns="72000" rtlCol="0" anchor="ctr"/>
+          <a:lstStyle/>
+          <a:p>
+            <a:pPr algn="ctr"/>
+            <a:r>
+              <a:rPr lang="en-US" sz="1100" b="1" dirty="0">
+                <a:solidFill>
+                  <a:schemeClr val="tx1">
+                    <a:lumMod val="65000"/>
+                    <a:lumOff val="35000"/>
+                  </a:schemeClr>
+                </a:solidFill>
+                <a:latin typeface="+mj-lt"/>
+              </a:rPr>
+              <a:t>SAP Edge Services</a:t>
+            </a:r>
+            <a:endParaRPr lang="en-US" sz="1100" b="1" i="1" dirty="0">
+              <a:solidFill>
+                <a:srgbClr val="1A9898"/>
+              </a:solidFill>
+            </a:endParaRPr>
+          </a:p>
+        </p:txBody>
+      </p:sp>
+      <p:sp>
+        <p:nvSpPr>
+          <p:cNvPr id="49" name="Rechteck 9">
+            <a:extLst>
+              <a:ext uri="{FF2B5EF4-FFF2-40B4-BE49-F238E27FC236}">
+                <a16:creationId xmlns:a16="http://schemas.microsoft.com/office/drawing/2014/main" id="{9ED5D27D-7F3A-FB42-98EF-9D4156B94886}"/>
+              </a:ext>
+            </a:extLst>
+          </p:cNvPr>
+          <p:cNvSpPr/>
+          <p:nvPr/>
+        </p:nvSpPr>
+        <p:spPr>
+          <a:xfrm>
+            <a:off x="2102826" y="3953666"/>
+            <a:ext cx="1538264" cy="520899"/>
+          </a:xfrm>
+          <a:prstGeom prst="rect">
+            <a:avLst/>
+          </a:prstGeom>
+          <a:noFill/>
+          <a:ln w="19050" cap="rnd">
+            <a:solidFill>
+              <a:srgbClr val="1A9898"/>
+            </a:solidFill>
+          </a:ln>
+        </p:spPr>
+        <p:style>
+          <a:lnRef idx="2">
+            <a:schemeClr val="accent1">
+              <a:shade val="50000"/>
+            </a:schemeClr>
+          </a:lnRef>
+          <a:fillRef idx="1">
+            <a:schemeClr val="accent1"/>
+          </a:fillRef>
+          <a:effectRef idx="0">
+            <a:schemeClr val="accent1"/>
+          </a:effectRef>
+          <a:fontRef idx="minor">
+            <a:schemeClr val="lt1"/>
+          </a:fontRef>
+        </p:style>
+        <p:txBody>
+          <a:bodyPr lIns="72000" tIns="72000" rIns="72000" bIns="72000" rtlCol="0" anchor="ctr">
+            <a:noAutofit/>
+          </a:bodyPr>
+          <a:lstStyle/>
+          <a:p>
+            <a:pPr algn="ctr"/>
+            <a:r>
+              <a:rPr lang="en-US" sz="1100" b="1" dirty="0" err="1">
+                <a:solidFill>
+                  <a:schemeClr val="tx1">
+                    <a:lumMod val="65000"/>
+                    <a:lumOff val="35000"/>
+                  </a:schemeClr>
+                </a:solidFill>
+              </a:rPr>
+              <a:t>IoT</a:t>
+            </a:r>
+            <a:r>
+              <a:rPr lang="en-US" sz="1100" b="1" dirty="0">
+                <a:solidFill>
+                  <a:schemeClr val="tx1">
+                    <a:lumMod val="65000"/>
+                    <a:lumOff val="35000"/>
+                  </a:schemeClr>
+                </a:solidFill>
+              </a:rPr>
+              <a:t> Gateway Edge*</a:t>
+            </a:r>
+            <a:endParaRPr lang="en-US" sz="1100" b="1" i="1" dirty="0">
+              <a:solidFill>
+                <a:srgbClr val="1A9898"/>
+              </a:solidFill>
+            </a:endParaRPr>
+          </a:p>
+        </p:txBody>
+      </p:sp>
+      <p:sp>
+        <p:nvSpPr>
+          <p:cNvPr id="50" name="TextBox 92">
+            <a:extLst>
+              <a:ext uri="{FF2B5EF4-FFF2-40B4-BE49-F238E27FC236}">
+                <a16:creationId xmlns:a16="http://schemas.microsoft.com/office/drawing/2014/main" id="{9BEC0EBB-3A08-CA46-83E9-75F01886F638}"/>
+              </a:ext>
+            </a:extLst>
+          </p:cNvPr>
+          <p:cNvSpPr txBox="1"/>
+          <p:nvPr/>
+        </p:nvSpPr>
+        <p:spPr>
+          <a:xfrm>
+            <a:off x="641154" y="5389508"/>
+            <a:ext cx="3012043" cy="161583"/>
+          </a:xfrm>
+          <a:prstGeom prst="rect">
+            <a:avLst/>
+          </a:prstGeom>
+          <a:noFill/>
+        </p:spPr>
+        <p:txBody>
+          <a:bodyPr wrap="none" lIns="0" tIns="0" rIns="0" bIns="0" rtlCol="0">
+            <a:spAutoFit/>
+          </a:bodyPr>
+          <a:lstStyle/>
+          <a:p>
+            <a:pPr fontAlgn="base">
+              <a:spcBef>
+                <a:spcPct val="50000"/>
+              </a:spcBef>
+              <a:spcAft>
+                <a:spcPct val="0"/>
+              </a:spcAft>
+              <a:buClr>
+                <a:srgbClr val="F0AB00"/>
+              </a:buClr>
+              <a:buSzPct val="80000"/>
+            </a:pPr>
+            <a:r>
+              <a:rPr lang="en-US" sz="1050" kern="0" dirty="0">
+                <a:latin typeface="+mn-lt"/>
+                <a:ea typeface="Arial Unicode MS" pitchFamily="34" charset="-128"/>
+                <a:cs typeface="Arial Unicode MS" pitchFamily="34" charset="-128"/>
+              </a:rPr>
+              <a:t>*Belongs to SAP Cloud Platform Internet of Things</a:t>
+            </a:r>
+          </a:p>
+        </p:txBody>
+      </p:sp>
+      <p:pic>
+        <p:nvPicPr>
+          <p:cNvPr id="51" name="Picture 93">
+            <a:extLst>
+              <a:ext uri="{FF2B5EF4-FFF2-40B4-BE49-F238E27FC236}">
+                <a16:creationId xmlns:a16="http://schemas.microsoft.com/office/drawing/2014/main" id="{2A2FB2A6-8B1E-8D46-ACF9-8537A5DD50D2}"/>
+              </a:ext>
+            </a:extLst>
+          </p:cNvPr>
+          <p:cNvPicPr>
+            <a:picLocks noChangeAspect="1"/>
+          </p:cNvPicPr>
+          <p:nvPr/>
+        </p:nvPicPr>
+        <p:blipFill>
+          <a:blip r:embed="rId8"/>
+          <a:stretch>
+            <a:fillRect/>
+          </a:stretch>
+        </p:blipFill>
+        <p:spPr>
+          <a:xfrm>
+            <a:off x="4405362" y="1297545"/>
+            <a:ext cx="1800000" cy="142469"/>
+          </a:xfrm>
+          <a:prstGeom prst="rect">
+            <a:avLst/>
+          </a:prstGeom>
+        </p:spPr>
+      </p:pic>
+      <p:pic>
+        <p:nvPicPr>
+          <p:cNvPr id="52" name="Picture 94">
+            <a:extLst>
+              <a:ext uri="{FF2B5EF4-FFF2-40B4-BE49-F238E27FC236}">
+                <a16:creationId xmlns:a16="http://schemas.microsoft.com/office/drawing/2014/main" id="{DF4422AA-C348-5C46-A49F-B8694517C3E0}"/>
+              </a:ext>
+            </a:extLst>
+          </p:cNvPr>
+          <p:cNvPicPr>
+            <a:picLocks noChangeAspect="1"/>
+          </p:cNvPicPr>
+          <p:nvPr/>
+        </p:nvPicPr>
+        <p:blipFill>
+          <a:blip r:embed="rId9"/>
+          <a:stretch>
+            <a:fillRect/>
+          </a:stretch>
+        </p:blipFill>
+        <p:spPr>
+          <a:xfrm>
+            <a:off x="10087187" y="2990997"/>
+            <a:ext cx="1040518" cy="112634"/>
+          </a:xfrm>
+          <a:prstGeom prst="rect">
+            <a:avLst/>
+          </a:prstGeom>
+        </p:spPr>
+      </p:pic>
+      <p:pic>
+        <p:nvPicPr>
+          <p:cNvPr id="53" name="Picture 89">
+            <a:extLst>
+              <a:ext uri="{FF2B5EF4-FFF2-40B4-BE49-F238E27FC236}">
+                <a16:creationId xmlns:a16="http://schemas.microsoft.com/office/drawing/2014/main" id="{F07485FA-E188-A14C-B920-02E7E36AA259}"/>
+              </a:ext>
+            </a:extLst>
+          </p:cNvPr>
+          <p:cNvPicPr>
+            <a:picLocks noChangeAspect="1"/>
+          </p:cNvPicPr>
+          <p:nvPr/>
+        </p:nvPicPr>
+        <p:blipFill>
+          <a:blip r:embed="rId10"/>
+          <a:stretch>
+            <a:fillRect/>
+          </a:stretch>
+        </p:blipFill>
+        <p:spPr>
+          <a:xfrm>
+            <a:off x="10087188" y="3857425"/>
+            <a:ext cx="999340" cy="191160"/>
+          </a:xfrm>
+          <a:prstGeom prst="rect">
+            <a:avLst/>
+          </a:prstGeom>
+        </p:spPr>
+      </p:pic>
+      <p:pic>
+        <p:nvPicPr>
+          <p:cNvPr id="54" name="Picture 95">
+            <a:extLst>
+              <a:ext uri="{FF2B5EF4-FFF2-40B4-BE49-F238E27FC236}">
+                <a16:creationId xmlns:a16="http://schemas.microsoft.com/office/drawing/2014/main" id="{545ED53E-87FF-CD45-A50B-2A58D1BFC80C}"/>
+              </a:ext>
+            </a:extLst>
+          </p:cNvPr>
+          <p:cNvPicPr>
+            <a:picLocks noChangeAspect="1"/>
+          </p:cNvPicPr>
+          <p:nvPr/>
+        </p:nvPicPr>
+        <p:blipFill>
+          <a:blip r:embed="rId11"/>
+          <a:stretch>
+            <a:fillRect/>
+          </a:stretch>
+        </p:blipFill>
+        <p:spPr>
+          <a:xfrm>
+            <a:off x="10087188" y="3424327"/>
+            <a:ext cx="1040518" cy="112402"/>
+          </a:xfrm>
+          <a:prstGeom prst="rect">
+            <a:avLst/>
+          </a:prstGeom>
+        </p:spPr>
+      </p:pic>
+      <p:pic>
+        <p:nvPicPr>
+          <p:cNvPr id="55" name="Picture 96">
+            <a:extLst>
+              <a:ext uri="{FF2B5EF4-FFF2-40B4-BE49-F238E27FC236}">
+                <a16:creationId xmlns:a16="http://schemas.microsoft.com/office/drawing/2014/main" id="{E9C5721B-4D51-8646-B911-5EDCCB7E403F}"/>
+              </a:ext>
+            </a:extLst>
+          </p:cNvPr>
+          <p:cNvPicPr>
+            <a:picLocks noChangeAspect="1"/>
+          </p:cNvPicPr>
+          <p:nvPr/>
+        </p:nvPicPr>
+        <p:blipFill>
+          <a:blip r:embed="rId12"/>
+          <a:stretch>
+            <a:fillRect/>
+          </a:stretch>
+        </p:blipFill>
+        <p:spPr>
+          <a:xfrm>
+            <a:off x="4545823" y="1681839"/>
+            <a:ext cx="540000" cy="540000"/>
+          </a:xfrm>
+          <a:prstGeom prst="rect">
+            <a:avLst/>
+          </a:prstGeom>
+        </p:spPr>
+      </p:pic>
+    </p:spTree>
+    <p:extLst>
+      <p:ext uri="{BB962C8B-B14F-4D97-AF65-F5344CB8AC3E}">
+        <p14:creationId xmlns:p14="http://schemas.microsoft.com/office/powerpoint/2010/main" val="4276840761"/>
+      </p:ext>
+    </p:extLst>
+  </p:cSld>
+  <p:clrMapOvr>
+    <a:masterClrMapping/>
+  </p:clrMapOvr>
+</p:sld>
+</file>
+
+<file path=ppt/slides/slide13.xml><?xml version="1.0" encoding="utf-8"?>
+<p:sld xmlns:a="http://schemas.openxmlformats.org/drawingml/2006/main" xmlns:r="http://schemas.openxmlformats.org/officeDocument/2006/relationships" xmlns:p="http://schemas.openxmlformats.org/presentationml/2006/main">
+  <p:cSld>
+    <p:spTree>
+      <p:nvGrpSpPr>
+        <p:cNvPr id="1" name=""/>
+        <p:cNvGrpSpPr/>
+        <p:nvPr/>
+      </p:nvGrpSpPr>
+      <p:grpSpPr>
+        <a:xfrm>
+          <a:off x="0" y="0"/>
+          <a:ext cx="0" cy="0"/>
+          <a:chOff x="0" y="0"/>
+          <a:chExt cx="0" cy="0"/>
+        </a:xfrm>
+      </p:grpSpPr>
+      <p:sp>
+        <p:nvSpPr>
+          <p:cNvPr id="2" name="Titel 1">
+            <a:extLst>
+              <a:ext uri="{FF2B5EF4-FFF2-40B4-BE49-F238E27FC236}">
+                <a16:creationId xmlns:a16="http://schemas.microsoft.com/office/drawing/2014/main" id="{1484EB3D-115D-1549-98E4-AFA0CE73BC50}"/>
+              </a:ext>
+            </a:extLst>
+          </p:cNvPr>
+          <p:cNvSpPr>
+            <a:spLocks noGrp="1"/>
+          </p:cNvSpPr>
+          <p:nvPr>
+            <p:ph type="title"/>
+          </p:nvPr>
+        </p:nvSpPr>
+        <p:spPr/>
+        <p:txBody>
+          <a:bodyPr/>
+          <a:lstStyle/>
+          <a:p>
+            <a:endParaRPr lang="de-DE" dirty="0"/>
+          </a:p>
+        </p:txBody>
+      </p:sp>
+      <p:pic>
+        <p:nvPicPr>
+          <p:cNvPr id="4" name="Inhaltsplatzhalter 3">
+            <a:extLst>
+              <a:ext uri="{FF2B5EF4-FFF2-40B4-BE49-F238E27FC236}">
+                <a16:creationId xmlns:a16="http://schemas.microsoft.com/office/drawing/2014/main" id="{24E9E276-1CE7-4A40-AE11-4D87A479878A}"/>
+              </a:ext>
+            </a:extLst>
+          </p:cNvPr>
+          <p:cNvPicPr>
+            <a:picLocks noGrp="1" noChangeAspect="1"/>
+          </p:cNvPicPr>
+          <p:nvPr>
+            <p:ph idx="1"/>
+          </p:nvPr>
+        </p:nvPicPr>
+        <p:blipFill>
+          <a:blip r:embed="rId2"/>
+          <a:stretch>
+            <a:fillRect/>
+          </a:stretch>
+        </p:blipFill>
+        <p:spPr>
+          <a:xfrm>
+            <a:off x="1812630" y="365125"/>
+            <a:ext cx="5708301" cy="6039217"/>
+          </a:xfrm>
+          <a:prstGeom prst="rect">
+            <a:avLst/>
+          </a:prstGeom>
+        </p:spPr>
+      </p:pic>
+    </p:spTree>
+    <p:extLst>
+      <p:ext uri="{BB962C8B-B14F-4D97-AF65-F5344CB8AC3E}">
+        <p14:creationId xmlns:p14="http://schemas.microsoft.com/office/powerpoint/2010/main" val="464300282"/>
       </p:ext>
     </p:extLst>
   </p:cSld>
@@ -20972,6 +24242,66 @@
 </p:sld>
 </file>
 
+<file path=ppt/slides/slide9.xml><?xml version="1.0" encoding="utf-8"?>
+<p:sld xmlns:a="http://schemas.openxmlformats.org/drawingml/2006/main" xmlns:r="http://schemas.openxmlformats.org/officeDocument/2006/relationships" xmlns:p="http://schemas.openxmlformats.org/presentationml/2006/main">
+  <p:cSld>
+    <p:spTree>
+      <p:nvGrpSpPr>
+        <p:cNvPr id="1" name=""/>
+        <p:cNvGrpSpPr/>
+        <p:nvPr/>
+      </p:nvGrpSpPr>
+      <p:grpSpPr>
+        <a:xfrm>
+          <a:off x="0" y="0"/>
+          <a:ext cx="0" cy="0"/>
+          <a:chOff x="0" y="0"/>
+          <a:chExt cx="0" cy="0"/>
+        </a:xfrm>
+      </p:grpSpPr>
+      <p:pic>
+        <p:nvPicPr>
+          <p:cNvPr id="4" name="Inhaltsplatzhalter 9">
+            <a:extLst>
+              <a:ext uri="{FF2B5EF4-FFF2-40B4-BE49-F238E27FC236}">
+                <a16:creationId xmlns:a16="http://schemas.microsoft.com/office/drawing/2014/main" id="{5A53C325-06C4-6940-8E1D-A0B300932FE1}"/>
+              </a:ext>
+            </a:extLst>
+          </p:cNvPr>
+          <p:cNvPicPr>
+            <a:picLocks noChangeAspect="1"/>
+          </p:cNvPicPr>
+          <p:nvPr/>
+        </p:nvPicPr>
+        <p:blipFill>
+          <a:blip r:embed="rId2"/>
+          <a:stretch>
+            <a:fillRect/>
+          </a:stretch>
+        </p:blipFill>
+        <p:spPr>
+          <a:xfrm>
+            <a:off x="774986" y="1672448"/>
+            <a:ext cx="10887686" cy="2804018"/>
+          </a:xfrm>
+          <a:prstGeom prst="rect">
+            <a:avLst/>
+          </a:prstGeom>
+        </p:spPr>
+      </p:pic>
+    </p:spTree>
+    <p:extLst>
+      <p:ext uri="{BB962C8B-B14F-4D97-AF65-F5344CB8AC3E}">
+        <p14:creationId xmlns:p14="http://schemas.microsoft.com/office/powerpoint/2010/main" val="1192244589"/>
+      </p:ext>
+    </p:extLst>
+  </p:cSld>
+  <p:clrMapOvr>
+    <a:masterClrMapping/>
+  </p:clrMapOvr>
+</p:sld>
+</file>
+
 <file path=ppt/theme/theme1.xml><?xml version="1.0" encoding="utf-8"?>
 <a:theme xmlns:a="http://schemas.openxmlformats.org/drawingml/2006/main" name="Office">
   <a:themeElements>

</xml_diff>

<commit_message>
chore(requirements): add new pal table
</commit_message>
<xml_diff>
--- a/presentations/models.pptx
+++ b/presentations/models.pptx
@@ -14207,7 +14207,7 @@
           <a:p>
             <a:fld id="{3248773E-0E1D-C44D-81DB-7C2B8F8EC2A7}" type="datetimeFigureOut">
               <a:rPr lang="de-DE" smtClean="0"/>
-              <a:t>03.01.20</a:t>
+              <a:t>06.01.20</a:t>
             </a:fld>
             <a:endParaRPr lang="de-DE"/>
           </a:p>
@@ -14405,7 +14405,7 @@
           <a:p>
             <a:fld id="{3248773E-0E1D-C44D-81DB-7C2B8F8EC2A7}" type="datetimeFigureOut">
               <a:rPr lang="de-DE" smtClean="0"/>
-              <a:t>03.01.20</a:t>
+              <a:t>06.01.20</a:t>
             </a:fld>
             <a:endParaRPr lang="de-DE"/>
           </a:p>
@@ -14613,7 +14613,7 @@
           <a:p>
             <a:fld id="{3248773E-0E1D-C44D-81DB-7C2B8F8EC2A7}" type="datetimeFigureOut">
               <a:rPr lang="de-DE" smtClean="0"/>
-              <a:t>03.01.20</a:t>
+              <a:t>06.01.20</a:t>
             </a:fld>
             <a:endParaRPr lang="de-DE"/>
           </a:p>
@@ -14811,7 +14811,7 @@
           <a:p>
             <a:fld id="{3248773E-0E1D-C44D-81DB-7C2B8F8EC2A7}" type="datetimeFigureOut">
               <a:rPr lang="de-DE" smtClean="0"/>
-              <a:t>03.01.20</a:t>
+              <a:t>06.01.20</a:t>
             </a:fld>
             <a:endParaRPr lang="de-DE"/>
           </a:p>
@@ -15086,7 +15086,7 @@
           <a:p>
             <a:fld id="{3248773E-0E1D-C44D-81DB-7C2B8F8EC2A7}" type="datetimeFigureOut">
               <a:rPr lang="de-DE" smtClean="0"/>
-              <a:t>03.01.20</a:t>
+              <a:t>06.01.20</a:t>
             </a:fld>
             <a:endParaRPr lang="de-DE"/>
           </a:p>
@@ -15351,7 +15351,7 @@
           <a:p>
             <a:fld id="{3248773E-0E1D-C44D-81DB-7C2B8F8EC2A7}" type="datetimeFigureOut">
               <a:rPr lang="de-DE" smtClean="0"/>
-              <a:t>03.01.20</a:t>
+              <a:t>06.01.20</a:t>
             </a:fld>
             <a:endParaRPr lang="de-DE"/>
           </a:p>
@@ -15763,7 +15763,7 @@
           <a:p>
             <a:fld id="{3248773E-0E1D-C44D-81DB-7C2B8F8EC2A7}" type="datetimeFigureOut">
               <a:rPr lang="de-DE" smtClean="0"/>
-              <a:t>03.01.20</a:t>
+              <a:t>06.01.20</a:t>
             </a:fld>
             <a:endParaRPr lang="de-DE"/>
           </a:p>
@@ -15904,7 +15904,7 @@
           <a:p>
             <a:fld id="{3248773E-0E1D-C44D-81DB-7C2B8F8EC2A7}" type="datetimeFigureOut">
               <a:rPr lang="de-DE" smtClean="0"/>
-              <a:t>03.01.20</a:t>
+              <a:t>06.01.20</a:t>
             </a:fld>
             <a:endParaRPr lang="de-DE"/>
           </a:p>
@@ -16017,7 +16017,7 @@
           <a:p>
             <a:fld id="{3248773E-0E1D-C44D-81DB-7C2B8F8EC2A7}" type="datetimeFigureOut">
               <a:rPr lang="de-DE" smtClean="0"/>
-              <a:t>03.01.20</a:t>
+              <a:t>06.01.20</a:t>
             </a:fld>
             <a:endParaRPr lang="de-DE"/>
           </a:p>
@@ -16328,7 +16328,7 @@
           <a:p>
             <a:fld id="{3248773E-0E1D-C44D-81DB-7C2B8F8EC2A7}" type="datetimeFigureOut">
               <a:rPr lang="de-DE" smtClean="0"/>
-              <a:t>03.01.20</a:t>
+              <a:t>06.01.20</a:t>
             </a:fld>
             <a:endParaRPr lang="de-DE"/>
           </a:p>
@@ -16616,7 +16616,7 @@
           <a:p>
             <a:fld id="{3248773E-0E1D-C44D-81DB-7C2B8F8EC2A7}" type="datetimeFigureOut">
               <a:rPr lang="de-DE" smtClean="0"/>
-              <a:t>03.01.20</a:t>
+              <a:t>06.01.20</a:t>
             </a:fld>
             <a:endParaRPr lang="de-DE"/>
           </a:p>
@@ -16857,7 +16857,7 @@
           <a:p>
             <a:fld id="{3248773E-0E1D-C44D-81DB-7C2B8F8EC2A7}" type="datetimeFigureOut">
               <a:rPr lang="de-DE" smtClean="0"/>
-              <a:t>03.01.20</a:t>
+              <a:t>06.01.20</a:t>
             </a:fld>
             <a:endParaRPr lang="de-DE"/>
           </a:p>
@@ -17631,7 +17631,7 @@
             <a:fld id="{D15945BB-CB13-F048-8038-6D73515B4389}" type="datetime1">
               <a:rPr lang="de-DE" smtClean="0"/>
               <a:pPr/>
-              <a:t>03.01.20</a:t>
+              <a:t>06.01.20</a:t>
             </a:fld>
             <a:endParaRPr lang="de-DE" dirty="0"/>
           </a:p>
@@ -23062,7 +23062,7 @@
         <p:spPr>
           <a:xfrm>
             <a:off x="7302960" y="2192287"/>
-            <a:ext cx="1410789" cy="1292662"/>
+            <a:ext cx="1749753" cy="1292662"/>
           </a:xfrm>
           <a:prstGeom prst="rect">
             <a:avLst/>
@@ -23095,7 +23095,7 @@
           <a:p>
             <a:r>
               <a:rPr lang="de-DE" sz="1200" dirty="0"/>
-              <a:t>Auftraggeber</a:t>
+              <a:t>Auftraggeber/Branche</a:t>
             </a:r>
           </a:p>
         </p:txBody>
@@ -23193,7 +23193,7 @@
         <p:spPr>
           <a:xfrm>
             <a:off x="2923992" y="1863511"/>
-            <a:ext cx="1555530" cy="861774"/>
+            <a:ext cx="1555530" cy="1200329"/>
           </a:xfrm>
           <a:prstGeom prst="rect">
             <a:avLst/>
@@ -23215,6 +23215,19 @@
             <a:r>
               <a:rPr lang="de-DE" sz="1200" dirty="0"/>
               <a:t>RAMI 4.0</a:t>
+            </a:r>
+          </a:p>
+          <a:p>
+            <a:r>
+              <a:rPr lang="de-DE" sz="1200" dirty="0"/>
+              <a:t>Industrie-4.0-</a:t>
+            </a:r>
+            <a:br>
+              <a:rPr lang="de-DE" sz="1200" dirty="0"/>
+            </a:br>
+            <a:r>
+              <a:rPr lang="de-DE" sz="1200" dirty="0"/>
+              <a:t>Komponente</a:t>
             </a:r>
             <a:endParaRPr lang="de-DE" dirty="0"/>
           </a:p>

</xml_diff>

<commit_message>
feat(requirements): add data flow
</commit_message>
<xml_diff>
--- a/presentations/models.pptx
+++ b/presentations/models.pptx
@@ -14207,7 +14207,7 @@
           <a:p>
             <a:fld id="{3248773E-0E1D-C44D-81DB-7C2B8F8EC2A7}" type="datetimeFigureOut">
               <a:rPr lang="de-DE" smtClean="0"/>
-              <a:t>06.01.20</a:t>
+              <a:t>09.01.20</a:t>
             </a:fld>
             <a:endParaRPr lang="de-DE"/>
           </a:p>
@@ -14405,7 +14405,7 @@
           <a:p>
             <a:fld id="{3248773E-0E1D-C44D-81DB-7C2B8F8EC2A7}" type="datetimeFigureOut">
               <a:rPr lang="de-DE" smtClean="0"/>
-              <a:t>06.01.20</a:t>
+              <a:t>09.01.20</a:t>
             </a:fld>
             <a:endParaRPr lang="de-DE"/>
           </a:p>
@@ -14613,7 +14613,7 @@
           <a:p>
             <a:fld id="{3248773E-0E1D-C44D-81DB-7C2B8F8EC2A7}" type="datetimeFigureOut">
               <a:rPr lang="de-DE" smtClean="0"/>
-              <a:t>06.01.20</a:t>
+              <a:t>09.01.20</a:t>
             </a:fld>
             <a:endParaRPr lang="de-DE"/>
           </a:p>
@@ -14811,7 +14811,7 @@
           <a:p>
             <a:fld id="{3248773E-0E1D-C44D-81DB-7C2B8F8EC2A7}" type="datetimeFigureOut">
               <a:rPr lang="de-DE" smtClean="0"/>
-              <a:t>06.01.20</a:t>
+              <a:t>09.01.20</a:t>
             </a:fld>
             <a:endParaRPr lang="de-DE"/>
           </a:p>
@@ -15086,7 +15086,7 @@
           <a:p>
             <a:fld id="{3248773E-0E1D-C44D-81DB-7C2B8F8EC2A7}" type="datetimeFigureOut">
               <a:rPr lang="de-DE" smtClean="0"/>
-              <a:t>06.01.20</a:t>
+              <a:t>09.01.20</a:t>
             </a:fld>
             <a:endParaRPr lang="de-DE"/>
           </a:p>
@@ -15351,7 +15351,7 @@
           <a:p>
             <a:fld id="{3248773E-0E1D-C44D-81DB-7C2B8F8EC2A7}" type="datetimeFigureOut">
               <a:rPr lang="de-DE" smtClean="0"/>
-              <a:t>06.01.20</a:t>
+              <a:t>09.01.20</a:t>
             </a:fld>
             <a:endParaRPr lang="de-DE"/>
           </a:p>
@@ -15763,7 +15763,7 @@
           <a:p>
             <a:fld id="{3248773E-0E1D-C44D-81DB-7C2B8F8EC2A7}" type="datetimeFigureOut">
               <a:rPr lang="de-DE" smtClean="0"/>
-              <a:t>06.01.20</a:t>
+              <a:t>09.01.20</a:t>
             </a:fld>
             <a:endParaRPr lang="de-DE"/>
           </a:p>
@@ -15904,7 +15904,7 @@
           <a:p>
             <a:fld id="{3248773E-0E1D-C44D-81DB-7C2B8F8EC2A7}" type="datetimeFigureOut">
               <a:rPr lang="de-DE" smtClean="0"/>
-              <a:t>06.01.20</a:t>
+              <a:t>09.01.20</a:t>
             </a:fld>
             <a:endParaRPr lang="de-DE"/>
           </a:p>
@@ -16017,7 +16017,7 @@
           <a:p>
             <a:fld id="{3248773E-0E1D-C44D-81DB-7C2B8F8EC2A7}" type="datetimeFigureOut">
               <a:rPr lang="de-DE" smtClean="0"/>
-              <a:t>06.01.20</a:t>
+              <a:t>09.01.20</a:t>
             </a:fld>
             <a:endParaRPr lang="de-DE"/>
           </a:p>
@@ -16328,7 +16328,7 @@
           <a:p>
             <a:fld id="{3248773E-0E1D-C44D-81DB-7C2B8F8EC2A7}" type="datetimeFigureOut">
               <a:rPr lang="de-DE" smtClean="0"/>
-              <a:t>06.01.20</a:t>
+              <a:t>09.01.20</a:t>
             </a:fld>
             <a:endParaRPr lang="de-DE"/>
           </a:p>
@@ -16616,7 +16616,7 @@
           <a:p>
             <a:fld id="{3248773E-0E1D-C44D-81DB-7C2B8F8EC2A7}" type="datetimeFigureOut">
               <a:rPr lang="de-DE" smtClean="0"/>
-              <a:t>06.01.20</a:t>
+              <a:t>09.01.20</a:t>
             </a:fld>
             <a:endParaRPr lang="de-DE"/>
           </a:p>
@@ -16857,7 +16857,7 @@
           <a:p>
             <a:fld id="{3248773E-0E1D-C44D-81DB-7C2B8F8EC2A7}" type="datetimeFigureOut">
               <a:rPr lang="de-DE" smtClean="0"/>
-              <a:t>06.01.20</a:t>
+              <a:t>09.01.20</a:t>
             </a:fld>
             <a:endParaRPr lang="de-DE"/>
           </a:p>
@@ -17631,7 +17631,7 @@
             <a:fld id="{D15945BB-CB13-F048-8038-6D73515B4389}" type="datetime1">
               <a:rPr lang="de-DE" smtClean="0"/>
               <a:pPr/>
-              <a:t>06.01.20</a:t>
+              <a:t>09.01.20</a:t>
             </a:fld>
             <a:endParaRPr lang="de-DE" dirty="0"/>
           </a:p>
@@ -23039,7 +23039,7 @@
         </p:blipFill>
         <p:spPr>
           <a:xfrm>
-            <a:off x="7285321" y="1718442"/>
+            <a:off x="7159009" y="1718442"/>
             <a:ext cx="777766" cy="641130"/>
           </a:xfrm>
           <a:prstGeom prst="rect">
@@ -23061,8 +23061,8 @@
         </p:nvSpPr>
         <p:spPr>
           <a:xfrm>
-            <a:off x="7302960" y="2192287"/>
-            <a:ext cx="1749753" cy="1292662"/>
+            <a:off x="7382081" y="2172063"/>
+            <a:ext cx="1749753" cy="1477328"/>
           </a:xfrm>
           <a:prstGeom prst="rect">
             <a:avLst/>
@@ -23089,13 +23089,19 @@
           <a:p>
             <a:r>
               <a:rPr lang="de-DE" sz="1200" dirty="0"/>
+              <a:t>Auftraggeber/Branche,</a:t>
+            </a:r>
+          </a:p>
+          <a:p>
+            <a:r>
+              <a:rPr lang="de-DE" sz="1200" dirty="0"/>
               <a:t>Entwickler/innen &amp; Architekt(inn)en, </a:t>
             </a:r>
           </a:p>
           <a:p>
             <a:r>
               <a:rPr lang="de-DE" sz="1200" dirty="0"/>
-              <a:t>Auftraggeber/Branche</a:t>
+              <a:t>Systemadministrator/in</a:t>
             </a:r>
           </a:p>
         </p:txBody>
@@ -23116,8 +23122,8 @@
         </p:nvCxnSpPr>
         <p:spPr>
           <a:xfrm flipV="1">
-            <a:off x="6479177" y="2383446"/>
-            <a:ext cx="755839" cy="425070"/>
+            <a:off x="6479177" y="2266034"/>
+            <a:ext cx="679832" cy="542482"/>
           </a:xfrm>
           <a:prstGeom prst="straightConnector1">
             <a:avLst/>

</xml_diff>

<commit_message>
chore(add bisschen code): add bisschen code
</commit_message>
<xml_diff>
--- a/presentations/models.pptx
+++ b/presentations/models.pptx
@@ -18,6 +18,7 @@
     <p:sldId id="266" r:id="rId12"/>
     <p:sldId id="267" r:id="rId13"/>
     <p:sldId id="268" r:id="rId14"/>
+    <p:sldId id="269" r:id="rId15"/>
   </p:sldIdLst>
   <p:sldSz cx="12192000" cy="6858000"/>
   <p:notesSz cx="6858000" cy="9144000"/>
@@ -14207,7 +14208,7 @@
           <a:p>
             <a:fld id="{3248773E-0E1D-C44D-81DB-7C2B8F8EC2A7}" type="datetimeFigureOut">
               <a:rPr lang="de-DE" smtClean="0"/>
-              <a:t>09.01.20</a:t>
+              <a:t>14.01.20</a:t>
             </a:fld>
             <a:endParaRPr lang="de-DE"/>
           </a:p>
@@ -14405,7 +14406,7 @@
           <a:p>
             <a:fld id="{3248773E-0E1D-C44D-81DB-7C2B8F8EC2A7}" type="datetimeFigureOut">
               <a:rPr lang="de-DE" smtClean="0"/>
-              <a:t>09.01.20</a:t>
+              <a:t>14.01.20</a:t>
             </a:fld>
             <a:endParaRPr lang="de-DE"/>
           </a:p>
@@ -14613,7 +14614,7 @@
           <a:p>
             <a:fld id="{3248773E-0E1D-C44D-81DB-7C2B8F8EC2A7}" type="datetimeFigureOut">
               <a:rPr lang="de-DE" smtClean="0"/>
-              <a:t>09.01.20</a:t>
+              <a:t>14.01.20</a:t>
             </a:fld>
             <a:endParaRPr lang="de-DE"/>
           </a:p>
@@ -14811,7 +14812,7 @@
           <a:p>
             <a:fld id="{3248773E-0E1D-C44D-81DB-7C2B8F8EC2A7}" type="datetimeFigureOut">
               <a:rPr lang="de-DE" smtClean="0"/>
-              <a:t>09.01.20</a:t>
+              <a:t>14.01.20</a:t>
             </a:fld>
             <a:endParaRPr lang="de-DE"/>
           </a:p>
@@ -15086,7 +15087,7 @@
           <a:p>
             <a:fld id="{3248773E-0E1D-C44D-81DB-7C2B8F8EC2A7}" type="datetimeFigureOut">
               <a:rPr lang="de-DE" smtClean="0"/>
-              <a:t>09.01.20</a:t>
+              <a:t>14.01.20</a:t>
             </a:fld>
             <a:endParaRPr lang="de-DE"/>
           </a:p>
@@ -15351,7 +15352,7 @@
           <a:p>
             <a:fld id="{3248773E-0E1D-C44D-81DB-7C2B8F8EC2A7}" type="datetimeFigureOut">
               <a:rPr lang="de-DE" smtClean="0"/>
-              <a:t>09.01.20</a:t>
+              <a:t>14.01.20</a:t>
             </a:fld>
             <a:endParaRPr lang="de-DE"/>
           </a:p>
@@ -15763,7 +15764,7 @@
           <a:p>
             <a:fld id="{3248773E-0E1D-C44D-81DB-7C2B8F8EC2A7}" type="datetimeFigureOut">
               <a:rPr lang="de-DE" smtClean="0"/>
-              <a:t>09.01.20</a:t>
+              <a:t>14.01.20</a:t>
             </a:fld>
             <a:endParaRPr lang="de-DE"/>
           </a:p>
@@ -15904,7 +15905,7 @@
           <a:p>
             <a:fld id="{3248773E-0E1D-C44D-81DB-7C2B8F8EC2A7}" type="datetimeFigureOut">
               <a:rPr lang="de-DE" smtClean="0"/>
-              <a:t>09.01.20</a:t>
+              <a:t>14.01.20</a:t>
             </a:fld>
             <a:endParaRPr lang="de-DE"/>
           </a:p>
@@ -16017,7 +16018,7 @@
           <a:p>
             <a:fld id="{3248773E-0E1D-C44D-81DB-7C2B8F8EC2A7}" type="datetimeFigureOut">
               <a:rPr lang="de-DE" smtClean="0"/>
-              <a:t>09.01.20</a:t>
+              <a:t>14.01.20</a:t>
             </a:fld>
             <a:endParaRPr lang="de-DE"/>
           </a:p>
@@ -16328,7 +16329,7 @@
           <a:p>
             <a:fld id="{3248773E-0E1D-C44D-81DB-7C2B8F8EC2A7}" type="datetimeFigureOut">
               <a:rPr lang="de-DE" smtClean="0"/>
-              <a:t>09.01.20</a:t>
+              <a:t>14.01.20</a:t>
             </a:fld>
             <a:endParaRPr lang="de-DE"/>
           </a:p>
@@ -16616,7 +16617,7 @@
           <a:p>
             <a:fld id="{3248773E-0E1D-C44D-81DB-7C2B8F8EC2A7}" type="datetimeFigureOut">
               <a:rPr lang="de-DE" smtClean="0"/>
-              <a:t>09.01.20</a:t>
+              <a:t>14.01.20</a:t>
             </a:fld>
             <a:endParaRPr lang="de-DE"/>
           </a:p>
@@ -16857,7 +16858,7 @@
           <a:p>
             <a:fld id="{3248773E-0E1D-C44D-81DB-7C2B8F8EC2A7}" type="datetimeFigureOut">
               <a:rPr lang="de-DE" smtClean="0"/>
-              <a:t>09.01.20</a:t>
+              <a:t>14.01.20</a:t>
             </a:fld>
             <a:endParaRPr lang="de-DE"/>
           </a:p>
@@ -17412,15 +17413,7 @@
           <a:p>
             <a:r>
               <a:rPr lang="de-DE" sz="1800" dirty="0"/>
-              <a:t>Architektur Internet </a:t>
-            </a:r>
-            <a:r>
-              <a:rPr lang="de-DE" sz="1800" dirty="0" err="1"/>
-              <a:t>of</a:t>
-            </a:r>
-            <a:r>
-              <a:rPr lang="de-DE" sz="1800" dirty="0"/>
-              <a:t> Things Service</a:t>
+              <a:t>Architektur Internet of Things Service</a:t>
             </a:r>
           </a:p>
         </p:txBody>
@@ -17595,10 +17588,17 @@
           </a:lstStyle>
           <a:p>
             <a:r>
-              <a:rPr lang="de-DE"/>
-              <a:t>SAP Leonardo IoT Foundation und Edge</a:t>
+              <a:rPr lang="de-DE" dirty="0"/>
+              <a:t>SAP Leonardo IoT </a:t>
             </a:r>
-            <a:endParaRPr lang="de-DE" dirty="0"/>
+            <a:r>
+              <a:rPr lang="de-DE" dirty="0" err="1"/>
+              <a:t>Foundation</a:t>
+            </a:r>
+            <a:r>
+              <a:rPr lang="de-DE" dirty="0"/>
+              <a:t> und Edge</a:t>
+            </a:r>
           </a:p>
         </p:txBody>
       </p:sp>
@@ -17631,7 +17631,7 @@
             <a:fld id="{D15945BB-CB13-F048-8038-6D73515B4389}" type="datetime1">
               <a:rPr lang="de-DE" smtClean="0"/>
               <a:pPr/>
-              <a:t>09.01.20</a:t>
+              <a:t>14.01.20</a:t>
             </a:fld>
             <a:endParaRPr lang="de-DE" dirty="0"/>
           </a:p>
@@ -20621,6 +20621,88 @@
     <p:extLst>
       <p:ext uri="{BB962C8B-B14F-4D97-AF65-F5344CB8AC3E}">
         <p14:creationId xmlns:p14="http://schemas.microsoft.com/office/powerpoint/2010/main" val="464300282"/>
+      </p:ext>
+    </p:extLst>
+  </p:cSld>
+  <p:clrMapOvr>
+    <a:masterClrMapping/>
+  </p:clrMapOvr>
+</p:sld>
+</file>
+
+<file path=ppt/slides/slide14.xml><?xml version="1.0" encoding="utf-8"?>
+<p:sld xmlns:a="http://schemas.openxmlformats.org/drawingml/2006/main" xmlns:r="http://schemas.openxmlformats.org/officeDocument/2006/relationships" xmlns:p="http://schemas.openxmlformats.org/presentationml/2006/main">
+  <p:cSld>
+    <p:spTree>
+      <p:nvGrpSpPr>
+        <p:cNvPr id="1" name=""/>
+        <p:cNvGrpSpPr/>
+        <p:nvPr/>
+      </p:nvGrpSpPr>
+      <p:grpSpPr>
+        <a:xfrm>
+          <a:off x="0" y="0"/>
+          <a:ext cx="0" cy="0"/>
+          <a:chOff x="0" y="0"/>
+          <a:chExt cx="0" cy="0"/>
+        </a:xfrm>
+      </p:grpSpPr>
+      <p:sp>
+        <p:nvSpPr>
+          <p:cNvPr id="2" name="Titel 1">
+            <a:extLst>
+              <a:ext uri="{FF2B5EF4-FFF2-40B4-BE49-F238E27FC236}">
+                <a16:creationId xmlns:a16="http://schemas.microsoft.com/office/drawing/2014/main" id="{17199C80-FEE2-7143-8588-69C4D6B19ECC}"/>
+              </a:ext>
+            </a:extLst>
+          </p:cNvPr>
+          <p:cNvSpPr>
+            <a:spLocks noGrp="1"/>
+          </p:cNvSpPr>
+          <p:nvPr>
+            <p:ph type="title"/>
+          </p:nvPr>
+        </p:nvSpPr>
+        <p:spPr/>
+        <p:txBody>
+          <a:bodyPr/>
+          <a:lstStyle/>
+          <a:p>
+            <a:endParaRPr lang="de-DE"/>
+          </a:p>
+        </p:txBody>
+      </p:sp>
+      <p:sp>
+        <p:nvSpPr>
+          <p:cNvPr id="3" name="Inhaltsplatzhalter 2">
+            <a:extLst>
+              <a:ext uri="{FF2B5EF4-FFF2-40B4-BE49-F238E27FC236}">
+                <a16:creationId xmlns:a16="http://schemas.microsoft.com/office/drawing/2014/main" id="{B37AAF40-A892-CE49-9B92-DA4A5DF4394F}"/>
+              </a:ext>
+            </a:extLst>
+          </p:cNvPr>
+          <p:cNvSpPr>
+            <a:spLocks noGrp="1"/>
+          </p:cNvSpPr>
+          <p:nvPr>
+            <p:ph idx="1"/>
+          </p:nvPr>
+        </p:nvSpPr>
+        <p:spPr/>
+        <p:txBody>
+          <a:bodyPr>
+            <a:normAutofit/>
+          </a:bodyPr>
+          <a:lstStyle/>
+          <a:p>
+            <a:endParaRPr lang="de-DE" dirty="0"/>
+          </a:p>
+        </p:txBody>
+      </p:sp>
+    </p:spTree>
+    <p:extLst>
+      <p:ext uri="{BB962C8B-B14F-4D97-AF65-F5344CB8AC3E}">
+        <p14:creationId xmlns:p14="http://schemas.microsoft.com/office/powerpoint/2010/main" val="2155447701"/>
       </p:ext>
     </p:extLst>
   </p:cSld>
@@ -23701,8 +23783,8 @@
         </p:nvSpPr>
         <p:spPr>
           <a:xfrm>
-            <a:off x="2715318" y="2366227"/>
-            <a:ext cx="4779762" cy="550926"/>
+            <a:off x="2715317" y="2366227"/>
+            <a:ext cx="6113373" cy="691328"/>
           </a:xfrm>
           <a:prstGeom prst="rect">
             <a:avLst/>
@@ -23752,8 +23834,8 @@
         </p:nvSpPr>
         <p:spPr>
           <a:xfrm>
-            <a:off x="2715318" y="1203457"/>
-            <a:ext cx="4779763" cy="1282446"/>
+            <a:off x="2715318" y="874252"/>
+            <a:ext cx="6113372" cy="1512313"/>
           </a:xfrm>
           <a:prstGeom prst="rect">
             <a:avLst/>
@@ -23763,6 +23845,13 @@
               <a:lumMod val="75000"/>
             </a:schemeClr>
           </a:solidFill>
+          <a:ln>
+            <a:solidFill>
+              <a:schemeClr val="accent1">
+                <a:lumMod val="50000"/>
+              </a:schemeClr>
+            </a:solidFill>
+          </a:ln>
         </p:spPr>
         <p:style>
           <a:lnRef idx="2">
@@ -23813,7 +23902,7 @@
         </p:blipFill>
         <p:spPr>
           <a:xfrm>
-            <a:off x="7850853" y="1203457"/>
+            <a:off x="4308867" y="4854240"/>
             <a:ext cx="2070714" cy="1600606"/>
           </a:xfrm>
         </p:spPr>
@@ -23832,16 +23921,16 @@
         </p:nvSpPr>
         <p:spPr>
           <a:xfrm>
-            <a:off x="3327967" y="1236186"/>
-            <a:ext cx="1606296" cy="226314"/>
+            <a:off x="3339264" y="937867"/>
+            <a:ext cx="1606296" cy="284410"/>
           </a:xfrm>
           <a:prstGeom prst="rect">
             <a:avLst/>
           </a:prstGeom>
           <a:solidFill>
-            <a:schemeClr val="accent5">
-              <a:lumMod val="40000"/>
-              <a:lumOff val="60000"/>
+            <a:schemeClr val="accent1">
+              <a:lumMod val="60000"/>
+              <a:lumOff val="40000"/>
             </a:schemeClr>
           </a:solidFill>
           <a:ln>
@@ -23872,7 +23961,11 @@
           <a:p>
             <a:pPr algn="ctr"/>
             <a:r>
-              <a:rPr lang="de-DE" sz="1400" dirty="0"/>
+              <a:rPr lang="de-DE" sz="1400" dirty="0">
+                <a:solidFill>
+                  <a:schemeClr val="tx2"/>
+                </a:solidFill>
+              </a:rPr>
               <a:t>Geschäftsprozesse</a:t>
             </a:r>
           </a:p>
@@ -23892,8 +23985,8 @@
         </p:nvSpPr>
         <p:spPr>
           <a:xfrm>
-            <a:off x="3327967" y="1514219"/>
-            <a:ext cx="1606296" cy="219456"/>
+            <a:off x="3339264" y="1276554"/>
+            <a:ext cx="1606296" cy="284410"/>
           </a:xfrm>
           <a:prstGeom prst="rect">
             <a:avLst/>
@@ -23932,7 +24025,7 @@
           <a:p>
             <a:pPr algn="ctr"/>
             <a:r>
-              <a:rPr lang="de-DE" sz="1400" dirty="0"/>
+              <a:rPr lang="de-DE" sz="1400" b="1" dirty="0"/>
               <a:t>Funktionen</a:t>
             </a:r>
           </a:p>
@@ -23952,8 +24045,8 @@
         </p:nvSpPr>
         <p:spPr>
           <a:xfrm>
-            <a:off x="3327967" y="1802657"/>
-            <a:ext cx="1606296" cy="219456"/>
+            <a:off x="3323253" y="1624908"/>
+            <a:ext cx="1606296" cy="282061"/>
           </a:xfrm>
           <a:prstGeom prst="rect">
             <a:avLst/>
@@ -23989,7 +24082,7 @@
           <a:p>
             <a:pPr algn="ctr"/>
             <a:r>
-              <a:rPr lang="de-DE" sz="1400" dirty="0"/>
+              <a:rPr lang="de-DE" sz="1400" b="1" dirty="0"/>
               <a:t>Information</a:t>
             </a:r>
           </a:p>
@@ -24009,8 +24102,8 @@
         </p:nvSpPr>
         <p:spPr>
           <a:xfrm>
-            <a:off x="3327967" y="2081013"/>
-            <a:ext cx="1606296" cy="226314"/>
+            <a:off x="3323253" y="1961108"/>
+            <a:ext cx="1606296" cy="284410"/>
           </a:xfrm>
           <a:prstGeom prst="rect">
             <a:avLst/>
@@ -24046,7 +24139,7 @@
           <a:p>
             <a:pPr algn="ctr"/>
             <a:r>
-              <a:rPr lang="de-DE" sz="1400" dirty="0"/>
+              <a:rPr lang="de-DE" sz="1400" b="1" dirty="0"/>
               <a:t>Kommunikation</a:t>
             </a:r>
           </a:p>
@@ -24066,8 +24159,8 @@
         </p:nvSpPr>
         <p:spPr>
           <a:xfrm>
-            <a:off x="3327967" y="2367031"/>
-            <a:ext cx="1606296" cy="219456"/>
+            <a:off x="3327967" y="2299657"/>
+            <a:ext cx="1601582" cy="284410"/>
           </a:xfrm>
           <a:prstGeom prst="rect">
             <a:avLst/>
@@ -24105,7 +24198,7 @@
           <a:p>
             <a:pPr algn="ctr"/>
             <a:r>
-              <a:rPr lang="de-DE" sz="1400" dirty="0"/>
+              <a:rPr lang="de-DE" sz="1400" b="1" dirty="0"/>
               <a:t>Integration</a:t>
             </a:r>
           </a:p>
@@ -24126,7 +24219,7 @@
         <p:spPr>
           <a:xfrm>
             <a:off x="3327967" y="2638206"/>
-            <a:ext cx="1606296" cy="219456"/>
+            <a:ext cx="1601582" cy="301673"/>
           </a:xfrm>
           <a:prstGeom prst="rect">
             <a:avLst/>
@@ -24164,7 +24257,7 @@
           <a:p>
             <a:pPr algn="ctr"/>
             <a:r>
-              <a:rPr lang="de-DE" sz="1400" dirty="0"/>
+              <a:rPr lang="de-DE" sz="1400" b="1" dirty="0"/>
               <a:t>Physische Dinge</a:t>
             </a:r>
           </a:p>
@@ -24262,16 +24355,16 @@
         </p:nvSpPr>
         <p:spPr>
           <a:xfrm>
-            <a:off x="5137953" y="1236186"/>
-            <a:ext cx="2192236" cy="226314"/>
+            <a:off x="5137953" y="938836"/>
+            <a:ext cx="2767794" cy="274043"/>
           </a:xfrm>
           <a:prstGeom prst="rect">
             <a:avLst/>
           </a:prstGeom>
           <a:solidFill>
-            <a:schemeClr val="accent5">
-              <a:lumMod val="40000"/>
-              <a:lumOff val="60000"/>
+            <a:schemeClr val="accent1">
+              <a:lumMod val="60000"/>
+              <a:lumOff val="40000"/>
             </a:schemeClr>
           </a:solidFill>
           <a:ln>
@@ -24302,8 +24395,12 @@
           <a:p>
             <a:pPr algn="ctr"/>
             <a:r>
-              <a:rPr lang="de-DE" sz="1400" dirty="0"/>
-              <a:t>Geschäftsprozesse</a:t>
+              <a:rPr lang="de-DE" sz="1400" dirty="0">
+                <a:solidFill>
+                  <a:schemeClr val="tx2"/>
+                </a:solidFill>
+              </a:rPr>
+              <a:t>SAP Cloud Platform Integration</a:t>
             </a:r>
           </a:p>
         </p:txBody>
@@ -24322,8 +24419,8 @@
         </p:nvSpPr>
         <p:spPr>
           <a:xfrm>
-            <a:off x="5137953" y="1514219"/>
-            <a:ext cx="2192236" cy="219456"/>
+            <a:off x="5137953" y="1276554"/>
+            <a:ext cx="2767794" cy="271176"/>
           </a:xfrm>
           <a:prstGeom prst="rect">
             <a:avLst/>
@@ -24362,8 +24459,8 @@
           <a:p>
             <a:pPr algn="ctr"/>
             <a:r>
-              <a:rPr lang="de-DE" sz="1400" dirty="0"/>
-              <a:t>Funktionen</a:t>
+              <a:rPr lang="de-DE" sz="1400" b="1" dirty="0"/>
+              <a:t>SAP Leonardo IoT</a:t>
             </a:r>
           </a:p>
         </p:txBody>
@@ -24382,8 +24479,8 @@
         </p:nvSpPr>
         <p:spPr>
           <a:xfrm>
-            <a:off x="5137953" y="1802657"/>
-            <a:ext cx="2192236" cy="219456"/>
+            <a:off x="5137953" y="1619233"/>
+            <a:ext cx="2767794" cy="271176"/>
           </a:xfrm>
           <a:prstGeom prst="rect">
             <a:avLst/>
@@ -24419,8 +24516,8 @@
           <a:p>
             <a:pPr algn="ctr"/>
             <a:r>
-              <a:rPr lang="de-DE" sz="1400" dirty="0"/>
-              <a:t>Information</a:t>
+              <a:rPr lang="de-DE" sz="1400" b="1" dirty="0"/>
+              <a:t>SCP Internet of Things Service </a:t>
             </a:r>
           </a:p>
         </p:txBody>
@@ -24439,8 +24536,8 @@
         </p:nvSpPr>
         <p:spPr>
           <a:xfrm>
-            <a:off x="5137953" y="2081013"/>
-            <a:ext cx="2192236" cy="226314"/>
+            <a:off x="5137953" y="1965868"/>
+            <a:ext cx="2767794" cy="279650"/>
           </a:xfrm>
           <a:prstGeom prst="rect">
             <a:avLst/>
@@ -24476,8 +24573,8 @@
           <a:p>
             <a:pPr algn="ctr"/>
             <a:r>
-              <a:rPr lang="de-DE" sz="1400" dirty="0"/>
-              <a:t>Kommunikation</a:t>
+              <a:rPr lang="de-DE" sz="1400" b="1" dirty="0"/>
+              <a:t>Gateway</a:t>
             </a:r>
           </a:p>
         </p:txBody>
@@ -24496,8 +24593,8 @@
         </p:nvSpPr>
         <p:spPr>
           <a:xfrm>
-            <a:off x="5145448" y="2367031"/>
-            <a:ext cx="2184742" cy="219456"/>
+            <a:off x="5137742" y="2299657"/>
+            <a:ext cx="2758332" cy="329137"/>
           </a:xfrm>
           <a:prstGeom prst="rect">
             <a:avLst/>
@@ -24535,8 +24632,8 @@
           <a:p>
             <a:pPr algn="ctr"/>
             <a:r>
-              <a:rPr lang="de-DE" sz="1400" dirty="0"/>
-              <a:t>Sensorik</a:t>
+              <a:rPr lang="de-DE" sz="1400" b="1" dirty="0"/>
+              <a:t>rechnerverarbeitbare Sensorik</a:t>
             </a:r>
           </a:p>
         </p:txBody>
@@ -24555,8 +24652,8 @@
         </p:nvSpPr>
         <p:spPr>
           <a:xfrm>
-            <a:off x="5137952" y="2638206"/>
-            <a:ext cx="2192237" cy="219456"/>
+            <a:off x="5137952" y="2670937"/>
+            <a:ext cx="2767795" cy="271176"/>
           </a:xfrm>
           <a:prstGeom prst="rect">
             <a:avLst/>
@@ -24594,12 +24691,151 @@
           <a:p>
             <a:pPr algn="ctr"/>
             <a:r>
-              <a:rPr lang="de-DE" sz="1400" dirty="0" err="1"/>
-              <a:t>Raspberry</a:t>
+              <a:rPr lang="de-DE" sz="1400" b="1" dirty="0"/>
+              <a:t>Produktionsanlage </a:t>
             </a:r>
+          </a:p>
+        </p:txBody>
+      </p:sp>
+      <p:sp>
+        <p:nvSpPr>
+          <p:cNvPr id="2" name="Textfeld 1">
+            <a:extLst>
+              <a:ext uri="{FF2B5EF4-FFF2-40B4-BE49-F238E27FC236}">
+                <a16:creationId xmlns:a16="http://schemas.microsoft.com/office/drawing/2014/main" id="{B6FD1344-F597-3148-B24D-BD7679F0C29A}"/>
+              </a:ext>
+            </a:extLst>
+          </p:cNvPr>
+          <p:cNvSpPr txBox="1"/>
+          <p:nvPr/>
+        </p:nvSpPr>
+        <p:spPr>
+          <a:xfrm rot="5400000">
+            <a:off x="7362536" y="1541578"/>
+            <a:ext cx="1512311" cy="276999"/>
+          </a:xfrm>
+          <a:prstGeom prst="rect">
+            <a:avLst/>
+          </a:prstGeom>
+        </p:spPr>
+        <p:style>
+          <a:lnRef idx="2">
+            <a:schemeClr val="accent1"/>
+          </a:lnRef>
+          <a:fillRef idx="1">
+            <a:schemeClr val="lt1"/>
+          </a:fillRef>
+          <a:effectRef idx="0">
+            <a:schemeClr val="accent1"/>
+          </a:effectRef>
+          <a:fontRef idx="minor">
+            <a:schemeClr val="dk1"/>
+          </a:fontRef>
+        </p:style>
+        <p:txBody>
+          <a:bodyPr wrap="square" rtlCol="0">
+            <a:spAutoFit/>
+          </a:bodyPr>
+          <a:lstStyle/>
+          <a:p>
             <a:r>
-              <a:rPr lang="de-DE" sz="1400" dirty="0"/>
-              <a:t> Pi </a:t>
+              <a:rPr lang="de-DE" sz="1200" dirty="0"/>
+              <a:t>Verwaltungsschale</a:t>
+            </a:r>
+            <a:endParaRPr lang="de-DE" sz="1050" dirty="0"/>
+          </a:p>
+        </p:txBody>
+      </p:sp>
+      <p:sp>
+        <p:nvSpPr>
+          <p:cNvPr id="3" name="Rechteck 2">
+            <a:extLst>
+              <a:ext uri="{FF2B5EF4-FFF2-40B4-BE49-F238E27FC236}">
+                <a16:creationId xmlns:a16="http://schemas.microsoft.com/office/drawing/2014/main" id="{CC950313-E25D-F34F-91B2-E4CE0BA9D5EC}"/>
+              </a:ext>
+            </a:extLst>
+          </p:cNvPr>
+          <p:cNvSpPr/>
+          <p:nvPr/>
+        </p:nvSpPr>
+        <p:spPr>
+          <a:xfrm>
+            <a:off x="7020031" y="4854240"/>
+            <a:ext cx="322524" cy="369332"/>
+          </a:xfrm>
+          <a:prstGeom prst="rect">
+            <a:avLst/>
+          </a:prstGeom>
+        </p:spPr>
+        <p:txBody>
+          <a:bodyPr wrap="none">
+            <a:spAutoFit/>
+          </a:bodyPr>
+          <a:lstStyle/>
+          <a:p>
+            <a:r>
+              <a:rPr lang="de-DE" dirty="0">
+                <a:solidFill>
+                  <a:srgbClr val="D4D4D4"/>
+                </a:solidFill>
+                <a:latin typeface="Fira Code" panose="020B0509050000020004" pitchFamily="49" charset="0"/>
+              </a:rPr>
+              <a:t> </a:t>
+            </a:r>
+            <a:endParaRPr lang="de-DE" b="0" dirty="0">
+              <a:solidFill>
+                <a:srgbClr val="D4D4D4"/>
+              </a:solidFill>
+              <a:effectLst/>
+              <a:latin typeface="Fira Code" panose="020B0509050000020004" pitchFamily="49" charset="0"/>
+            </a:endParaRPr>
+          </a:p>
+        </p:txBody>
+      </p:sp>
+      <p:sp>
+        <p:nvSpPr>
+          <p:cNvPr id="22" name="Textfeld 21">
+            <a:extLst>
+              <a:ext uri="{FF2B5EF4-FFF2-40B4-BE49-F238E27FC236}">
+                <a16:creationId xmlns:a16="http://schemas.microsoft.com/office/drawing/2014/main" id="{B7AFE130-CFB2-E14C-97A9-A15995BB4446}"/>
+              </a:ext>
+            </a:extLst>
+          </p:cNvPr>
+          <p:cNvSpPr txBox="1"/>
+          <p:nvPr/>
+        </p:nvSpPr>
+        <p:spPr>
+          <a:xfrm rot="5400000">
+            <a:off x="7487361" y="1801493"/>
+            <a:ext cx="2004244" cy="276999"/>
+          </a:xfrm>
+          <a:prstGeom prst="rect">
+            <a:avLst/>
+          </a:prstGeom>
+        </p:spPr>
+        <p:style>
+          <a:lnRef idx="2">
+            <a:schemeClr val="accent1"/>
+          </a:lnRef>
+          <a:fillRef idx="1">
+            <a:schemeClr val="lt1"/>
+          </a:fillRef>
+          <a:effectRef idx="0">
+            <a:schemeClr val="accent1"/>
+          </a:effectRef>
+          <a:fontRef idx="minor">
+            <a:schemeClr val="dk1"/>
+          </a:fontRef>
+        </p:style>
+        <p:txBody>
+          <a:bodyPr wrap="square" rtlCol="0">
+            <a:spAutoFit/>
+          </a:bodyPr>
+          <a:lstStyle/>
+          <a:p>
+            <a:r>
+              <a:rPr lang="de-DE" sz="1200" dirty="0"/>
+              <a:t>Industrie-4.0-Komponente</a:t>
             </a:r>
           </a:p>
         </p:txBody>

</xml_diff>